<commit_message>
minor modification in final ppt
</commit_message>
<xml_diff>
--- a/outsidewar/deliverables/EEteamJ1 Final Presentation.pptx
+++ b/outsidewar/deliverables/EEteamJ1 Final Presentation.pptx
@@ -5,7 +5,7 @@
     <p:sldMasterId id="2147483649" r:id="rId1"/>
   </p:sldMasterIdLst>
   <p:notesMasterIdLst>
-    <p:notesMasterId r:id="rId36"/>
+    <p:notesMasterId r:id="rId35"/>
   </p:notesMasterIdLst>
   <p:sldIdLst>
     <p:sldId id="343" r:id="rId2"/>
@@ -13,35 +13,34 @@
     <p:sldId id="384" r:id="rId4"/>
     <p:sldId id="370" r:id="rId5"/>
     <p:sldId id="371" r:id="rId6"/>
-    <p:sldId id="392" r:id="rId7"/>
-    <p:sldId id="372" r:id="rId8"/>
-    <p:sldId id="386" r:id="rId9"/>
-    <p:sldId id="414" r:id="rId10"/>
-    <p:sldId id="416" r:id="rId11"/>
-    <p:sldId id="415" r:id="rId12"/>
-    <p:sldId id="387" r:id="rId13"/>
-    <p:sldId id="394" r:id="rId14"/>
-    <p:sldId id="374" r:id="rId15"/>
-    <p:sldId id="395" r:id="rId16"/>
-    <p:sldId id="375" r:id="rId17"/>
-    <p:sldId id="420" r:id="rId18"/>
-    <p:sldId id="419" r:id="rId19"/>
-    <p:sldId id="376" r:id="rId20"/>
-    <p:sldId id="377" r:id="rId21"/>
-    <p:sldId id="417" r:id="rId22"/>
-    <p:sldId id="385" r:id="rId23"/>
-    <p:sldId id="418" r:id="rId24"/>
-    <p:sldId id="373" r:id="rId25"/>
-    <p:sldId id="378" r:id="rId26"/>
-    <p:sldId id="381" r:id="rId27"/>
-    <p:sldId id="412" r:id="rId28"/>
-    <p:sldId id="382" r:id="rId29"/>
-    <p:sldId id="379" r:id="rId30"/>
-    <p:sldId id="390" r:id="rId31"/>
-    <p:sldId id="380" r:id="rId32"/>
-    <p:sldId id="393" r:id="rId33"/>
-    <p:sldId id="389" r:id="rId34"/>
-    <p:sldId id="348" r:id="rId35"/>
+    <p:sldId id="372" r:id="rId7"/>
+    <p:sldId id="386" r:id="rId8"/>
+    <p:sldId id="414" r:id="rId9"/>
+    <p:sldId id="416" r:id="rId10"/>
+    <p:sldId id="415" r:id="rId11"/>
+    <p:sldId id="387" r:id="rId12"/>
+    <p:sldId id="394" r:id="rId13"/>
+    <p:sldId id="374" r:id="rId14"/>
+    <p:sldId id="395" r:id="rId15"/>
+    <p:sldId id="375" r:id="rId16"/>
+    <p:sldId id="420" r:id="rId17"/>
+    <p:sldId id="419" r:id="rId18"/>
+    <p:sldId id="376" r:id="rId19"/>
+    <p:sldId id="377" r:id="rId20"/>
+    <p:sldId id="417" r:id="rId21"/>
+    <p:sldId id="385" r:id="rId22"/>
+    <p:sldId id="418" r:id="rId23"/>
+    <p:sldId id="373" r:id="rId24"/>
+    <p:sldId id="378" r:id="rId25"/>
+    <p:sldId id="381" r:id="rId26"/>
+    <p:sldId id="412" r:id="rId27"/>
+    <p:sldId id="382" r:id="rId28"/>
+    <p:sldId id="379" r:id="rId29"/>
+    <p:sldId id="390" r:id="rId30"/>
+    <p:sldId id="380" r:id="rId31"/>
+    <p:sldId id="393" r:id="rId32"/>
+    <p:sldId id="389" r:id="rId33"/>
+    <p:sldId id="348" r:id="rId34"/>
   </p:sldIdLst>
   <p:sldSz cx="13004800" cy="9753600"/>
   <p:notesSz cx="6858000" cy="9144000"/>
@@ -276,11 +275,11 @@
         </c:dLbls>
         <c:gapWidth val="219"/>
         <c:overlap val="-27"/>
-        <c:axId val="1719244848"/>
-        <c:axId val="1719245936"/>
+        <c:axId val="-107204848"/>
+        <c:axId val="-107202672"/>
       </c:barChart>
       <c:catAx>
-        <c:axId val="1719244848"/>
+        <c:axId val="-107204848"/>
         <c:scaling>
           <c:orientation val="minMax"/>
         </c:scaling>
@@ -365,7 +364,7 @@
             <a:endParaRPr lang="en-US"/>
           </a:p>
         </c:txPr>
-        <c:crossAx val="1719245936"/>
+        <c:crossAx val="-107202672"/>
         <c:crosses val="autoZero"/>
         <c:auto val="1"/>
         <c:lblAlgn val="ctr"/>
@@ -373,7 +372,7 @@
         <c:noMultiLvlLbl val="0"/>
       </c:catAx>
       <c:valAx>
-        <c:axId val="1719245936"/>
+        <c:axId val="-107202672"/>
         <c:scaling>
           <c:orientation val="minMax"/>
         </c:scaling>
@@ -464,7 +463,7 @@
             <a:endParaRPr lang="en-US"/>
           </a:p>
         </c:txPr>
-        <c:crossAx val="1719244848"/>
+        <c:crossAx val="-107204848"/>
         <c:crosses val="autoZero"/>
         <c:crossBetween val="between"/>
       </c:valAx>
@@ -644,7 +643,7 @@
             <a:fld id="{C3811913-B8DA-492B-B826-9518B83BF6E7}" type="datetimeFigureOut">
               <a:rPr lang="en-US"/>
               <a:pPr/>
-              <a:t>12/30/2015</a:t>
+              <a:t>1/5/2016</a:t>
             </a:fld>
             <a:endParaRPr lang="en-US"/>
           </a:p>
@@ -1524,7 +1523,7 @@
         <p:spPr>
           <a:extLst>
             <a:ext uri="{FAA26D3D-D897-4be2-8F04-BA451C77F1D7}">
-              <ma14:placeholderFlag xmlns="" xmlns:ma14="http://schemas.microsoft.com/office/mac/drawingml/2011/main" val="1"/>
+              <ma14:placeholderFlag xmlns:ma14="http://schemas.microsoft.com/office/mac/drawingml/2011/main" xmlns="" val="1"/>
             </a:ext>
           </a:extLst>
         </p:spPr>
@@ -1857,7 +1856,7 @@
         <p:spPr>
           <a:extLst>
             <a:ext uri="{FAA26D3D-D897-4be2-8F04-BA451C77F1D7}">
-              <ma14:placeholderFlag xmlns="" xmlns:ma14="http://schemas.microsoft.com/office/mac/drawingml/2011/main" val="1"/>
+              <ma14:placeholderFlag xmlns:ma14="http://schemas.microsoft.com/office/mac/drawingml/2011/main" xmlns="" val="1"/>
             </a:ext>
           </a:extLst>
         </p:spPr>
@@ -2169,7 +2168,7 @@
         <p:spPr>
           <a:extLst>
             <a:ext uri="{FAA26D3D-D897-4be2-8F04-BA451C77F1D7}">
-              <ma14:placeholderFlag xmlns="" xmlns:ma14="http://schemas.microsoft.com/office/mac/drawingml/2011/main" val="1"/>
+              <ma14:placeholderFlag xmlns:ma14="http://schemas.microsoft.com/office/mac/drawingml/2011/main" xmlns="" val="1"/>
             </a:ext>
           </a:extLst>
         </p:spPr>
@@ -2506,7 +2505,7 @@
         <p:spPr>
           <a:extLst>
             <a:ext uri="{FAA26D3D-D897-4be2-8F04-BA451C77F1D7}">
-              <ma14:placeholderFlag xmlns="" xmlns:ma14="http://schemas.microsoft.com/office/mac/drawingml/2011/main" val="1"/>
+              <ma14:placeholderFlag xmlns:ma14="http://schemas.microsoft.com/office/mac/drawingml/2011/main" xmlns="" val="1"/>
             </a:ext>
           </a:extLst>
         </p:spPr>
@@ -2701,7 +2700,7 @@
         <p:spPr>
           <a:extLst>
             <a:ext uri="{FAA26D3D-D897-4be2-8F04-BA451C77F1D7}">
-              <ma14:placeholderFlag xmlns="" xmlns:ma14="http://schemas.microsoft.com/office/mac/drawingml/2011/main" val="1"/>
+              <ma14:placeholderFlag xmlns:ma14="http://schemas.microsoft.com/office/mac/drawingml/2011/main" xmlns="" val="1"/>
             </a:ext>
           </a:extLst>
         </p:spPr>
@@ -2977,7 +2976,7 @@
         <p:spPr>
           <a:extLst>
             <a:ext uri="{FAA26D3D-D897-4be2-8F04-BA451C77F1D7}">
-              <ma14:placeholderFlag xmlns="" xmlns:ma14="http://schemas.microsoft.com/office/mac/drawingml/2011/main" val="1"/>
+              <ma14:placeholderFlag xmlns:ma14="http://schemas.microsoft.com/office/mac/drawingml/2011/main" xmlns="" val="1"/>
             </a:ext>
           </a:extLst>
         </p:spPr>
@@ -3227,7 +3226,7 @@
         <p:spPr>
           <a:extLst>
             <a:ext uri="{FAA26D3D-D897-4be2-8F04-BA451C77F1D7}">
-              <ma14:placeholderFlag xmlns="" xmlns:ma14="http://schemas.microsoft.com/office/mac/drawingml/2011/main" val="1"/>
+              <ma14:placeholderFlag xmlns:ma14="http://schemas.microsoft.com/office/mac/drawingml/2011/main" xmlns="" val="1"/>
             </a:ext>
           </a:extLst>
         </p:spPr>
@@ -3513,7 +3512,7 @@
               </a14:hiddenEffects>
             </a:ext>
             <a:ext uri="{FAA26D3D-D897-4be2-8F04-BA451C77F1D7}">
-              <ma14:placeholderFlag xmlns="" xmlns:ma14="http://schemas.microsoft.com/office/mac/drawingml/2011/main" val="1"/>
+              <ma14:placeholderFlag xmlns:ma14="http://schemas.microsoft.com/office/mac/drawingml/2011/main" xmlns="" val="1"/>
             </a:ext>
           </a:extLst>
         </p:spPr>
@@ -4167,7 +4166,7 @@
         <p:spPr>
           <a:extLst>
             <a:ext uri="{FAA26D3D-D897-4be2-8F04-BA451C77F1D7}">
-              <ma14:placeholderFlag xmlns="" xmlns:ma14="http://schemas.microsoft.com/office/mac/drawingml/2011/main" val="1"/>
+              <ma14:placeholderFlag xmlns:ma14="http://schemas.microsoft.com/office/mac/drawingml/2011/main" xmlns="" val="1"/>
             </a:ext>
           </a:extLst>
         </p:spPr>
@@ -4637,8 +4636,8 @@
         </p:nvSpPr>
         <p:spPr>
           <a:xfrm>
-            <a:off x="1270000" y="304800"/>
-            <a:ext cx="10464800" cy="2743200"/>
+            <a:off x="1270000" y="254000"/>
+            <a:ext cx="10464800" cy="2794000"/>
           </a:xfrm>
         </p:spPr>
         <p:txBody>
@@ -4647,7 +4646,7 @@
           <a:p>
             <a:r>
               <a:rPr lang="en-US" dirty="0"/>
-              <a:t>Service / Request Flow</a:t>
+              <a:t>Market Trends</a:t>
             </a:r>
             <a:br>
               <a:rPr lang="en-US" dirty="0"/>
@@ -4680,36 +4679,122 @@
           </a:p>
         </p:txBody>
       </p:sp>
-      <p:pic>
-        <p:nvPicPr>
+      <p:sp>
+        <p:nvSpPr>
           <p:cNvPr id="5" name="Content Placeholder 4"/>
-          <p:cNvPicPr>
-            <a:picLocks noGrp="1" noChangeAspect="1"/>
-          </p:cNvPicPr>
+          <p:cNvSpPr txBox="1">
+            <a:spLocks noGrp="1"/>
+          </p:cNvSpPr>
           <p:nvPr>
             <p:ph idx="1"/>
           </p:nvPr>
-        </p:nvPicPr>
-        <p:blipFill>
-          <a:blip r:embed="rId2"/>
-          <a:stretch>
-            <a:fillRect/>
-          </a:stretch>
-        </p:blipFill>
+        </p:nvSpPr>
         <p:spPr>
           <a:xfrm>
-            <a:off x="1016000" y="2751499"/>
-            <a:ext cx="10896600" cy="6382976"/>
+            <a:off x="1270000" y="2540000"/>
+            <a:ext cx="10464800" cy="6253315"/>
           </a:xfrm>
           <a:prstGeom prst="rect">
             <a:avLst/>
           </a:prstGeom>
+          <a:noFill/>
         </p:spPr>
-      </p:pic>
+        <p:txBody>
+          <a:bodyPr wrap="square" rtlCol="0">
+            <a:spAutoFit/>
+          </a:bodyPr>
+          <a:lstStyle/>
+          <a:p>
+            <a:pPr marL="285750" indent="-285750">
+              <a:lnSpc>
+                <a:spcPct val="150000"/>
+              </a:lnSpc>
+              <a:buFont typeface="Arial" panose="020B0604020202020204" pitchFamily="34" charset="0"/>
+              <a:buChar char="•"/>
+            </a:pPr>
+            <a:r>
+              <a:rPr lang="en-US" sz="2400" dirty="0">
+                <a:latin typeface="Times New Roman" pitchFamily="18" charset="0"/>
+                <a:ea typeface="ヒラギノ角ゴ ProN W3" charset="0"/>
+                <a:cs typeface="Times New Roman" pitchFamily="18" charset="0"/>
+              </a:rPr>
+              <a:t>The world is at the herald of a new era, known as the On Demand Economy. </a:t>
+            </a:r>
+          </a:p>
+          <a:p>
+            <a:pPr marL="285750" indent="-285750">
+              <a:lnSpc>
+                <a:spcPct val="150000"/>
+              </a:lnSpc>
+              <a:buFont typeface="Arial" panose="020B0604020202020204" pitchFamily="34" charset="0"/>
+              <a:buChar char="•"/>
+            </a:pPr>
+            <a:r>
+              <a:rPr lang="en-US" sz="2400" dirty="0">
+                <a:latin typeface="Times New Roman" pitchFamily="18" charset="0"/>
+                <a:ea typeface="ヒラギノ角ゴ ProN W3" charset="0"/>
+                <a:cs typeface="Times New Roman" pitchFamily="18" charset="0"/>
+              </a:rPr>
+              <a:t>It a surprise to know about the pace at which mobile internet is penetrating our lifestyle, and how this development is growing on every modern citizen. </a:t>
+            </a:r>
+          </a:p>
+          <a:p>
+            <a:pPr marL="285750" indent="-285750">
+              <a:lnSpc>
+                <a:spcPct val="150000"/>
+              </a:lnSpc>
+              <a:buFont typeface="Arial" panose="020B0604020202020204" pitchFamily="34" charset="0"/>
+              <a:buChar char="•"/>
+            </a:pPr>
+            <a:r>
+              <a:rPr lang="en-US" sz="2400" dirty="0">
+                <a:latin typeface="Times New Roman" pitchFamily="18" charset="0"/>
+                <a:ea typeface="ヒラギノ角ゴ ProN W3" charset="0"/>
+                <a:cs typeface="Times New Roman" pitchFamily="18" charset="0"/>
+              </a:rPr>
+              <a:t>‘Instant gratification’ is no longer a craze, but a lifestyle choice that every consumer with a smartphone has made. </a:t>
+            </a:r>
+          </a:p>
+          <a:p>
+            <a:pPr marL="285750" indent="-285750">
+              <a:lnSpc>
+                <a:spcPct val="150000"/>
+              </a:lnSpc>
+              <a:buFont typeface="Arial" panose="020B0604020202020204" pitchFamily="34" charset="0"/>
+              <a:buChar char="•"/>
+            </a:pPr>
+            <a:r>
+              <a:rPr lang="en-US" sz="2400" dirty="0">
+                <a:latin typeface="Times New Roman" pitchFamily="18" charset="0"/>
+                <a:ea typeface="ヒラギノ角ゴ ProN W3" charset="0"/>
+                <a:cs typeface="Times New Roman" pitchFamily="18" charset="0"/>
+              </a:rPr>
+              <a:t>Given that many entrepreneurs are coming up with unique ideas disrupting value chains across many established industry verticals.</a:t>
+            </a:r>
+          </a:p>
+          <a:p>
+            <a:pPr marL="285750" indent="-285750">
+              <a:lnSpc>
+                <a:spcPct val="150000"/>
+              </a:lnSpc>
+              <a:buFont typeface="Arial" panose="020B0604020202020204" pitchFamily="34" charset="0"/>
+              <a:buChar char="•"/>
+            </a:pPr>
+            <a:r>
+              <a:rPr lang="en-US" sz="2400" dirty="0">
+                <a:latin typeface="Times New Roman" pitchFamily="18" charset="0"/>
+                <a:ea typeface="ヒラギノ角ゴ ProN W3" charset="0"/>
+                <a:cs typeface="Times New Roman" pitchFamily="18" charset="0"/>
+              </a:rPr>
+              <a:t>Powering On Demand Businesses from the technology perspective to conceptualize di­fferent aspects of business idea.</a:t>
+            </a:r>
+          </a:p>
+        </p:txBody>
+      </p:sp>
     </p:spTree>
     <p:extLst>
       <p:ext uri="{BB962C8B-B14F-4D97-AF65-F5344CB8AC3E}">
-        <p14:creationId xmlns:p14="http://schemas.microsoft.com/office/powerpoint/2010/main" val="1593345565"/>
+        <p14:creationId xmlns:p14="http://schemas.microsoft.com/office/powerpoint/2010/main" val="2950380194"/>
       </p:ext>
     </p:extLst>
   </p:cSld>
@@ -4741,6 +4826,131 @@
       </p:grpSpPr>
       <p:sp>
         <p:nvSpPr>
+          <p:cNvPr id="2" name="Content Placeholder 1"/>
+          <p:cNvSpPr>
+            <a:spLocks noGrp="1"/>
+          </p:cNvSpPr>
+          <p:nvPr>
+            <p:ph idx="1"/>
+          </p:nvPr>
+        </p:nvSpPr>
+        <p:spPr>
+          <a:xfrm>
+            <a:off x="1270000" y="2540000"/>
+            <a:ext cx="10464800" cy="5308600"/>
+          </a:xfrm>
+        </p:spPr>
+        <p:txBody>
+          <a:bodyPr/>
+          <a:lstStyle/>
+          <a:p>
+            <a:pPr>
+              <a:buFont typeface="Arial" pitchFamily="34" charset="0"/>
+              <a:buChar char="•"/>
+            </a:pPr>
+            <a:r>
+              <a:rPr lang="en-US" sz="2400" dirty="0">
+                <a:latin typeface="Times New Roman" pitchFamily="18" charset="0"/>
+                <a:ea typeface="ヒラギノ角ゴ ProN W3" charset="0"/>
+                <a:cs typeface="Times New Roman" pitchFamily="18" charset="0"/>
+              </a:rPr>
+              <a:t>Database design ER diagram</a:t>
+            </a:r>
+          </a:p>
+          <a:p>
+            <a:pPr>
+              <a:buFont typeface="Arial" pitchFamily="34" charset="0"/>
+              <a:buChar char="•"/>
+            </a:pPr>
+            <a:r>
+              <a:rPr lang="en-US" altLang="ja-JP" sz="2400" dirty="0" smtClean="0">
+                <a:latin typeface="Times New Roman" pitchFamily="18" charset="0"/>
+                <a:ea typeface="ヒラギノ角ゴ ProN W3" charset="0"/>
+                <a:cs typeface="Times New Roman" pitchFamily="18" charset="0"/>
+              </a:rPr>
+              <a:t>4+1 Solution Architecture Document</a:t>
+            </a:r>
+          </a:p>
+          <a:p>
+            <a:pPr>
+              <a:buFont typeface="Arial" pitchFamily="34" charset="0"/>
+              <a:buChar char="•"/>
+            </a:pPr>
+            <a:r>
+              <a:rPr lang="en-US" altLang="ja-JP" sz="2400" dirty="0" smtClean="0">
+                <a:latin typeface="Times New Roman" pitchFamily="18" charset="0"/>
+                <a:ea typeface="ヒラギノ角ゴ ProN W3" charset="0"/>
+                <a:cs typeface="Times New Roman" pitchFamily="18" charset="0"/>
+              </a:rPr>
+              <a:t>Sonar Reports</a:t>
+            </a:r>
+          </a:p>
+          <a:p>
+            <a:pPr>
+              <a:buFont typeface="Arial" pitchFamily="34" charset="0"/>
+              <a:buChar char="•"/>
+            </a:pPr>
+            <a:r>
+              <a:rPr lang="en-US" altLang="ja-JP" sz="2400" dirty="0" smtClean="0">
+                <a:latin typeface="Times New Roman" pitchFamily="18" charset="0"/>
+                <a:ea typeface="ヒラギノ角ゴ ProN W3" charset="0"/>
+                <a:cs typeface="Times New Roman" pitchFamily="18" charset="0"/>
+              </a:rPr>
+              <a:t>Application </a:t>
+            </a:r>
+            <a:r>
+              <a:rPr lang="en-US" altLang="ja-JP" sz="2400" dirty="0">
+                <a:latin typeface="Times New Roman" pitchFamily="18" charset="0"/>
+                <a:ea typeface="ヒラギノ角ゴ ProN W3" charset="0"/>
+                <a:cs typeface="Times New Roman" pitchFamily="18" charset="0"/>
+              </a:rPr>
+              <a:t>Deployment </a:t>
+            </a:r>
+            <a:r>
+              <a:rPr lang="en-US" altLang="ja-JP" sz="2400" dirty="0" smtClean="0">
+                <a:latin typeface="Times New Roman" pitchFamily="18" charset="0"/>
+                <a:ea typeface="ヒラギノ角ゴ ProN W3" charset="0"/>
+                <a:cs typeface="Times New Roman" pitchFamily="18" charset="0"/>
+              </a:rPr>
+              <a:t>Document</a:t>
+            </a:r>
+          </a:p>
+          <a:p>
+            <a:pPr marL="0" indent="0">
+              <a:buNone/>
+            </a:pPr>
+            <a:endParaRPr lang="en-US" altLang="ja-JP" sz="2400" dirty="0" smtClean="0">
+              <a:latin typeface="Times New Roman" pitchFamily="18" charset="0"/>
+              <a:ea typeface="ヒラギノ角ゴ ProN W3" charset="0"/>
+              <a:cs typeface="Times New Roman" pitchFamily="18" charset="0"/>
+            </a:endParaRPr>
+          </a:p>
+          <a:p>
+            <a:pPr>
+              <a:buFont typeface="Arial" pitchFamily="34" charset="0"/>
+              <a:buChar char="•"/>
+            </a:pPr>
+            <a:endParaRPr lang="en-US" altLang="ja-JP" sz="2400" dirty="0">
+              <a:latin typeface="Times New Roman" pitchFamily="18" charset="0"/>
+              <a:ea typeface="ヒラギノ角ゴ ProN W3" charset="0"/>
+              <a:cs typeface="Times New Roman" pitchFamily="18" charset="0"/>
+            </a:endParaRPr>
+          </a:p>
+          <a:p>
+            <a:pPr>
+              <a:buFont typeface="Arial" pitchFamily="34" charset="0"/>
+              <a:buChar char="•"/>
+            </a:pPr>
+            <a:endParaRPr lang="en-US" altLang="ja-JP" sz="2400" dirty="0" smtClean="0">
+              <a:latin typeface="Times New Roman" pitchFamily="18" charset="0"/>
+              <a:ea typeface="ヒラギノ角ゴ ProN W3" charset="0"/>
+              <a:cs typeface="Times New Roman" pitchFamily="18" charset="0"/>
+            </a:endParaRPr>
+          </a:p>
+        </p:txBody>
+      </p:sp>
+      <p:sp>
+        <p:nvSpPr>
           <p:cNvPr id="3" name="Title 2"/>
           <p:cNvSpPr>
             <a:spLocks noGrp="1"/>
@@ -4749,23 +4959,15 @@
             <p:ph type="title"/>
           </p:nvPr>
         </p:nvSpPr>
-        <p:spPr>
-          <a:xfrm>
-            <a:off x="1270000" y="254000"/>
-            <a:ext cx="10464800" cy="2794000"/>
-          </a:xfrm>
-        </p:spPr>
+        <p:spPr/>
         <p:txBody>
           <a:bodyPr/>
           <a:lstStyle/>
           <a:p>
             <a:r>
-              <a:rPr lang="en-US" dirty="0"/>
-              <a:t>Market Trends</a:t>
-            </a:r>
-            <a:br>
-              <a:rPr lang="en-US" dirty="0"/>
-            </a:br>
+              <a:rPr lang="en-US" dirty="0" smtClean="0"/>
+              <a:t>Deliverables</a:t>
+            </a:r>
             <a:endParaRPr lang="en-US" dirty="0"/>
           </a:p>
         </p:txBody>
@@ -4794,122 +4996,10 @@
           </a:p>
         </p:txBody>
       </p:sp>
-      <p:sp>
-        <p:nvSpPr>
-          <p:cNvPr id="5" name="Content Placeholder 4"/>
-          <p:cNvSpPr txBox="1">
-            <a:spLocks noGrp="1"/>
-          </p:cNvSpPr>
-          <p:nvPr>
-            <p:ph idx="1"/>
-          </p:nvPr>
-        </p:nvSpPr>
-        <p:spPr>
-          <a:xfrm>
-            <a:off x="1270000" y="2540000"/>
-            <a:ext cx="10464800" cy="6253315"/>
-          </a:xfrm>
-          <a:prstGeom prst="rect">
-            <a:avLst/>
-          </a:prstGeom>
-          <a:noFill/>
-        </p:spPr>
-        <p:txBody>
-          <a:bodyPr wrap="square" rtlCol="0">
-            <a:spAutoFit/>
-          </a:bodyPr>
-          <a:lstStyle/>
-          <a:p>
-            <a:pPr marL="285750" indent="-285750">
-              <a:lnSpc>
-                <a:spcPct val="150000"/>
-              </a:lnSpc>
-              <a:buFont typeface="Arial" panose="020B0604020202020204" pitchFamily="34" charset="0"/>
-              <a:buChar char="•"/>
-            </a:pPr>
-            <a:r>
-              <a:rPr lang="en-US" sz="2400" dirty="0">
-                <a:latin typeface="Times New Roman" pitchFamily="18" charset="0"/>
-                <a:ea typeface="ヒラギノ角ゴ ProN W3" charset="0"/>
-                <a:cs typeface="Times New Roman" pitchFamily="18" charset="0"/>
-              </a:rPr>
-              <a:t>The world is at the herald of a new era, known as the On Demand Economy. </a:t>
-            </a:r>
-          </a:p>
-          <a:p>
-            <a:pPr marL="285750" indent="-285750">
-              <a:lnSpc>
-                <a:spcPct val="150000"/>
-              </a:lnSpc>
-              <a:buFont typeface="Arial" panose="020B0604020202020204" pitchFamily="34" charset="0"/>
-              <a:buChar char="•"/>
-            </a:pPr>
-            <a:r>
-              <a:rPr lang="en-US" sz="2400" dirty="0">
-                <a:latin typeface="Times New Roman" pitchFamily="18" charset="0"/>
-                <a:ea typeface="ヒラギノ角ゴ ProN W3" charset="0"/>
-                <a:cs typeface="Times New Roman" pitchFamily="18" charset="0"/>
-              </a:rPr>
-              <a:t>It a surprise to know about the pace at which mobile internet is penetrating our lifestyle, and how this development is growing on every modern citizen. </a:t>
-            </a:r>
-          </a:p>
-          <a:p>
-            <a:pPr marL="285750" indent="-285750">
-              <a:lnSpc>
-                <a:spcPct val="150000"/>
-              </a:lnSpc>
-              <a:buFont typeface="Arial" panose="020B0604020202020204" pitchFamily="34" charset="0"/>
-              <a:buChar char="•"/>
-            </a:pPr>
-            <a:r>
-              <a:rPr lang="en-US" sz="2400" dirty="0">
-                <a:latin typeface="Times New Roman" pitchFamily="18" charset="0"/>
-                <a:ea typeface="ヒラギノ角ゴ ProN W3" charset="0"/>
-                <a:cs typeface="Times New Roman" pitchFamily="18" charset="0"/>
-              </a:rPr>
-              <a:t>‘Instant gratification’ is no longer a craze, but a lifestyle choice that every consumer with a smartphone has made. </a:t>
-            </a:r>
-          </a:p>
-          <a:p>
-            <a:pPr marL="285750" indent="-285750">
-              <a:lnSpc>
-                <a:spcPct val="150000"/>
-              </a:lnSpc>
-              <a:buFont typeface="Arial" panose="020B0604020202020204" pitchFamily="34" charset="0"/>
-              <a:buChar char="•"/>
-            </a:pPr>
-            <a:r>
-              <a:rPr lang="en-US" sz="2400" dirty="0">
-                <a:latin typeface="Times New Roman" pitchFamily="18" charset="0"/>
-                <a:ea typeface="ヒラギノ角ゴ ProN W3" charset="0"/>
-                <a:cs typeface="Times New Roman" pitchFamily="18" charset="0"/>
-              </a:rPr>
-              <a:t>Given that many entrepreneurs are coming up with unique ideas disrupting value chains across many established industry verticals.</a:t>
-            </a:r>
-          </a:p>
-          <a:p>
-            <a:pPr marL="285750" indent="-285750">
-              <a:lnSpc>
-                <a:spcPct val="150000"/>
-              </a:lnSpc>
-              <a:buFont typeface="Arial" panose="020B0604020202020204" pitchFamily="34" charset="0"/>
-              <a:buChar char="•"/>
-            </a:pPr>
-            <a:r>
-              <a:rPr lang="en-US" sz="2400" dirty="0">
-                <a:latin typeface="Times New Roman" pitchFamily="18" charset="0"/>
-                <a:ea typeface="ヒラギノ角ゴ ProN W3" charset="0"/>
-                <a:cs typeface="Times New Roman" pitchFamily="18" charset="0"/>
-              </a:rPr>
-              <a:t>Powering On Demand Businesses from the technology perspective to conceptualize di­fferent aspects of business idea.</a:t>
-            </a:r>
-          </a:p>
-        </p:txBody>
-      </p:sp>
     </p:spTree>
     <p:extLst>
       <p:ext uri="{BB962C8B-B14F-4D97-AF65-F5344CB8AC3E}">
-        <p14:creationId xmlns:p14="http://schemas.microsoft.com/office/powerpoint/2010/main" val="2950380194"/>
+        <p14:creationId xmlns:p14="http://schemas.microsoft.com/office/powerpoint/2010/main" val="3020450558"/>
       </p:ext>
     </p:extLst>
   </p:cSld>
@@ -4919,6 +5009,13 @@
   <p:transition>
     <p:fade/>
   </p:transition>
+  <p:timing>
+    <p:tnLst>
+      <p:par>
+        <p:cTn id="1" dur="indefinite" restart="never" nodeType="tmRoot"/>
+      </p:par>
+    </p:tnLst>
+  </p:timing>
 </p:sld>
 </file>
 
@@ -4964,26 +5061,12 @@
               <a:buChar char="•"/>
             </a:pPr>
             <a:r>
-              <a:rPr lang="en-US" sz="2400" dirty="0">
-                <a:latin typeface="Times New Roman" pitchFamily="18" charset="0"/>
-                <a:ea typeface="ヒラギノ角ゴ ProN W3" charset="0"/>
-                <a:cs typeface="Times New Roman" pitchFamily="18" charset="0"/>
-              </a:rPr>
-              <a:t>Database design ER diagram</a:t>
-            </a:r>
-          </a:p>
-          <a:p>
-            <a:pPr>
-              <a:buFont typeface="Arial" pitchFamily="34" charset="0"/>
-              <a:buChar char="•"/>
-            </a:pPr>
-            <a:r>
               <a:rPr lang="en-US" altLang="ja-JP" sz="2400" dirty="0" smtClean="0">
                 <a:latin typeface="Times New Roman" pitchFamily="18" charset="0"/>
                 <a:ea typeface="ヒラギノ角ゴ ProN W3" charset="0"/>
                 <a:cs typeface="Times New Roman" pitchFamily="18" charset="0"/>
               </a:rPr>
-              <a:t>4+1 Solution Architecture Document</a:t>
+              <a:t>Test Plan</a:t>
             </a:r>
           </a:p>
           <a:p>
@@ -4997,7 +5080,7 @@
                 <a:ea typeface="ヒラギノ角ゴ ProN W3" charset="0"/>
                 <a:cs typeface="Times New Roman" pitchFamily="18" charset="0"/>
               </a:rPr>
-              <a:t>Sonar Reports</a:t>
+              <a:t>Test case scenarios</a:t>
             </a:r>
           </a:p>
           <a:p>
@@ -5011,56 +5094,8 @@
                 <a:ea typeface="ヒラギノ角ゴ ProN W3" charset="0"/>
                 <a:cs typeface="Times New Roman" pitchFamily="18" charset="0"/>
               </a:rPr>
-              <a:t>Application </a:t>
-            </a:r>
-            <a:r>
-              <a:rPr lang="en-US" altLang="ja-JP" sz="2400" dirty="0">
-                <a:latin typeface="Times New Roman" pitchFamily="18" charset="0"/>
-                <a:ea typeface="ヒラギノ角ゴ ProN W3" charset="0"/>
-                <a:cs typeface="Times New Roman" pitchFamily="18" charset="0"/>
-              </a:rPr>
-              <a:t>Deployment </a:t>
-            </a:r>
-            <a:r>
-              <a:rPr lang="en-US" altLang="ja-JP" sz="2400" dirty="0" smtClean="0">
-                <a:latin typeface="Times New Roman" pitchFamily="18" charset="0"/>
-                <a:ea typeface="ヒラギノ角ゴ ProN W3" charset="0"/>
-                <a:cs typeface="Times New Roman" pitchFamily="18" charset="0"/>
-              </a:rPr>
-              <a:t>Document</a:t>
-            </a:r>
-          </a:p>
-          <a:p>
-            <a:pPr marL="0" indent="0">
-              <a:buNone/>
-            </a:pPr>
-            <a:endParaRPr lang="en-US" altLang="ja-JP" sz="2400" dirty="0" smtClean="0">
-              <a:latin typeface="Times New Roman" pitchFamily="18" charset="0"/>
-              <a:ea typeface="ヒラギノ角ゴ ProN W3" charset="0"/>
-              <a:cs typeface="Times New Roman" pitchFamily="18" charset="0"/>
-            </a:endParaRPr>
-          </a:p>
-          <a:p>
-            <a:pPr>
-              <a:buFont typeface="Arial" pitchFamily="34" charset="0"/>
-              <a:buChar char="•"/>
-            </a:pPr>
-            <a:endParaRPr lang="en-US" altLang="ja-JP" sz="2400" dirty="0">
-              <a:latin typeface="Times New Roman" pitchFamily="18" charset="0"/>
-              <a:ea typeface="ヒラギノ角ゴ ProN W3" charset="0"/>
-              <a:cs typeface="Times New Roman" pitchFamily="18" charset="0"/>
-            </a:endParaRPr>
-          </a:p>
-          <a:p>
-            <a:pPr>
-              <a:buFont typeface="Arial" pitchFamily="34" charset="0"/>
-              <a:buChar char="•"/>
-            </a:pPr>
-            <a:endParaRPr lang="en-US" altLang="ja-JP" sz="2400" dirty="0" smtClean="0">
-              <a:latin typeface="Times New Roman" pitchFamily="18" charset="0"/>
-              <a:ea typeface="ヒラギノ角ゴ ProN W3" charset="0"/>
-              <a:cs typeface="Times New Roman" pitchFamily="18" charset="0"/>
-            </a:endParaRPr>
+              <a:t>Automation framework Document</a:t>
+            </a:r>
           </a:p>
         </p:txBody>
       </p:sp>
@@ -5114,7 +5149,7 @@
     </p:spTree>
     <p:extLst>
       <p:ext uri="{BB962C8B-B14F-4D97-AF65-F5344CB8AC3E}">
-        <p14:creationId xmlns:p14="http://schemas.microsoft.com/office/powerpoint/2010/main" val="3020450558"/>
+        <p14:creationId xmlns:p14="http://schemas.microsoft.com/office/powerpoint/2010/main" val="3878379446"/>
       </p:ext>
     </p:extLst>
   </p:cSld>
@@ -5161,56 +5196,16 @@
             <p:ph idx="1"/>
           </p:nvPr>
         </p:nvSpPr>
-        <p:spPr>
-          <a:xfrm>
-            <a:off x="1270000" y="2540000"/>
-            <a:ext cx="10464800" cy="5308600"/>
-          </a:xfrm>
-        </p:spPr>
+        <p:spPr/>
         <p:txBody>
           <a:bodyPr/>
           <a:lstStyle/>
           <a:p>
-            <a:pPr>
-              <a:buFont typeface="Arial" pitchFamily="34" charset="0"/>
-              <a:buChar char="•"/>
-            </a:pPr>
-            <a:r>
-              <a:rPr lang="en-US" altLang="ja-JP" sz="2400" dirty="0" smtClean="0">
-                <a:latin typeface="Times New Roman" pitchFamily="18" charset="0"/>
-                <a:ea typeface="ヒラギノ角ゴ ProN W3" charset="0"/>
-                <a:cs typeface="Times New Roman" pitchFamily="18" charset="0"/>
-              </a:rPr>
-              <a:t>Test Plan</a:t>
-            </a:r>
-          </a:p>
-          <a:p>
-            <a:pPr>
-              <a:buFont typeface="Arial" pitchFamily="34" charset="0"/>
-              <a:buChar char="•"/>
-            </a:pPr>
-            <a:r>
-              <a:rPr lang="en-US" altLang="ja-JP" sz="2400" dirty="0" smtClean="0">
-                <a:latin typeface="Times New Roman" pitchFamily="18" charset="0"/>
-                <a:ea typeface="ヒラギノ角ゴ ProN W3" charset="0"/>
-                <a:cs typeface="Times New Roman" pitchFamily="18" charset="0"/>
-              </a:rPr>
-              <a:t>Test case scenarios</a:t>
-            </a:r>
-          </a:p>
-          <a:p>
-            <a:pPr>
-              <a:buFont typeface="Arial" pitchFamily="34" charset="0"/>
-              <a:buChar char="•"/>
-            </a:pPr>
-            <a:r>
-              <a:rPr lang="en-US" altLang="ja-JP" sz="2400" dirty="0" smtClean="0">
-                <a:latin typeface="Times New Roman" pitchFamily="18" charset="0"/>
-                <a:ea typeface="ヒラギノ角ゴ ProN W3" charset="0"/>
-                <a:cs typeface="Times New Roman" pitchFamily="18" charset="0"/>
-              </a:rPr>
-              <a:t>Automation framework Document</a:t>
-            </a:r>
+            <a:pPr lvl="0"/>
+            <a:endParaRPr lang="en-US" sz="3200" dirty="0" smtClean="0"/>
+          </a:p>
+          <a:p>
+            <a:endParaRPr lang="en-US" sz="3200" dirty="0"/>
           </a:p>
         </p:txBody>
       </p:sp>
@@ -5224,14 +5219,20 @@
             <p:ph type="title"/>
           </p:nvPr>
         </p:nvSpPr>
-        <p:spPr/>
+        <p:spPr>
+          <a:xfrm>
+            <a:off x="1397000" y="3733800"/>
+            <a:ext cx="10464800" cy="2032000"/>
+          </a:xfrm>
+        </p:spPr>
         <p:txBody>
           <a:bodyPr/>
           <a:lstStyle/>
           <a:p>
+            <a:pPr algn="ctr"/>
             <a:r>
               <a:rPr lang="en-US" dirty="0" smtClean="0"/>
-              <a:t>Deliverables</a:t>
+              <a:t>Application Demonstration</a:t>
             </a:r>
             <a:endParaRPr lang="en-US" dirty="0"/>
           </a:p>
@@ -5264,7 +5265,7 @@
     </p:spTree>
     <p:extLst>
       <p:ext uri="{BB962C8B-B14F-4D97-AF65-F5344CB8AC3E}">
-        <p14:creationId xmlns:p14="http://schemas.microsoft.com/office/powerpoint/2010/main" val="3878379446"/>
+        <p14:creationId xmlns:p14="http://schemas.microsoft.com/office/powerpoint/2010/main" val="850754063"/>
       </p:ext>
     </p:extLst>
   </p:cSld>
@@ -5303,12 +5304,12 @@
       </p:grpSpPr>
       <p:sp>
         <p:nvSpPr>
-          <p:cNvPr id="2" name="Content Placeholder 1"/>
+          <p:cNvPr id="4" name="Slide Number Placeholder 3"/>
           <p:cNvSpPr>
             <a:spLocks noGrp="1"/>
           </p:cNvSpPr>
           <p:nvPr>
-            <p:ph idx="1"/>
+            <p:ph type="sldNum" sz="quarter" idx="10"/>
           </p:nvPr>
         </p:nvSpPr>
         <p:spPr/>
@@ -5316,17 +5317,18 @@
           <a:bodyPr/>
           <a:lstStyle/>
           <a:p>
-            <a:pPr lvl="0"/>
-            <a:endParaRPr lang="en-US" sz="3200" dirty="0" smtClean="0"/>
-          </a:p>
-          <a:p>
-            <a:endParaRPr lang="en-US" sz="3200" dirty="0"/>
+            <a:fld id="{FD0725B6-5DD5-4EEE-A0F0-572C51C8D44F}" type="slidenum">
+              <a:rPr lang="en-US" smtClean="0"/>
+              <a:pPr/>
+              <a:t>14</a:t>
+            </a:fld>
+            <a:endParaRPr lang="en-US"/>
           </a:p>
         </p:txBody>
       </p:sp>
       <p:sp>
         <p:nvSpPr>
-          <p:cNvPr id="3" name="Title 2"/>
+          <p:cNvPr id="5" name="Title 2"/>
           <p:cNvSpPr>
             <a:spLocks noGrp="1"/>
           </p:cNvSpPr>
@@ -5347,40 +5349,16 @@
             <a:pPr algn="ctr"/>
             <a:r>
               <a:rPr lang="en-US" dirty="0" smtClean="0"/>
-              <a:t>Application Demonstration</a:t>
+              <a:t>Code Walkthrough</a:t>
             </a:r>
             <a:endParaRPr lang="en-US" dirty="0"/>
-          </a:p>
-        </p:txBody>
-      </p:sp>
-      <p:sp>
-        <p:nvSpPr>
-          <p:cNvPr id="4" name="Slide Number Placeholder 3"/>
-          <p:cNvSpPr>
-            <a:spLocks noGrp="1"/>
-          </p:cNvSpPr>
-          <p:nvPr>
-            <p:ph type="sldNum" sz="quarter" idx="10"/>
-          </p:nvPr>
-        </p:nvSpPr>
-        <p:spPr/>
-        <p:txBody>
-          <a:bodyPr/>
-          <a:lstStyle/>
-          <a:p>
-            <a:fld id="{FD0725B6-5DD5-4EEE-A0F0-572C51C8D44F}" type="slidenum">
-              <a:rPr lang="en-US" smtClean="0"/>
-              <a:pPr/>
-              <a:t>14</a:t>
-            </a:fld>
-            <a:endParaRPr lang="en-US"/>
           </a:p>
         </p:txBody>
       </p:sp>
     </p:spTree>
     <p:extLst>
       <p:ext uri="{BB962C8B-B14F-4D97-AF65-F5344CB8AC3E}">
-        <p14:creationId xmlns:p14="http://schemas.microsoft.com/office/powerpoint/2010/main" val="850754063"/>
+        <p14:creationId xmlns:p14="http://schemas.microsoft.com/office/powerpoint/2010/main" val="3768333805"/>
       </p:ext>
     </p:extLst>
   </p:cSld>
@@ -5419,99 +5397,6 @@
       </p:grpSpPr>
       <p:sp>
         <p:nvSpPr>
-          <p:cNvPr id="4" name="Slide Number Placeholder 3"/>
-          <p:cNvSpPr>
-            <a:spLocks noGrp="1"/>
-          </p:cNvSpPr>
-          <p:nvPr>
-            <p:ph type="sldNum" sz="quarter" idx="10"/>
-          </p:nvPr>
-        </p:nvSpPr>
-        <p:spPr/>
-        <p:txBody>
-          <a:bodyPr/>
-          <a:lstStyle/>
-          <a:p>
-            <a:fld id="{FD0725B6-5DD5-4EEE-A0F0-572C51C8D44F}" type="slidenum">
-              <a:rPr lang="en-US" smtClean="0"/>
-              <a:pPr/>
-              <a:t>15</a:t>
-            </a:fld>
-            <a:endParaRPr lang="en-US"/>
-          </a:p>
-        </p:txBody>
-      </p:sp>
-      <p:sp>
-        <p:nvSpPr>
-          <p:cNvPr id="5" name="Title 2"/>
-          <p:cNvSpPr>
-            <a:spLocks noGrp="1"/>
-          </p:cNvSpPr>
-          <p:nvPr>
-            <p:ph type="title"/>
-          </p:nvPr>
-        </p:nvSpPr>
-        <p:spPr>
-          <a:xfrm>
-            <a:off x="1397000" y="3733800"/>
-            <a:ext cx="10464800" cy="2032000"/>
-          </a:xfrm>
-        </p:spPr>
-        <p:txBody>
-          <a:bodyPr/>
-          <a:lstStyle/>
-          <a:p>
-            <a:pPr algn="ctr"/>
-            <a:r>
-              <a:rPr lang="en-US" dirty="0" smtClean="0"/>
-              <a:t>Code Walkthrough</a:t>
-            </a:r>
-            <a:endParaRPr lang="en-US" dirty="0"/>
-          </a:p>
-        </p:txBody>
-      </p:sp>
-    </p:spTree>
-    <p:extLst>
-      <p:ext uri="{BB962C8B-B14F-4D97-AF65-F5344CB8AC3E}">
-        <p14:creationId xmlns:p14="http://schemas.microsoft.com/office/powerpoint/2010/main" val="3768333805"/>
-      </p:ext>
-    </p:extLst>
-  </p:cSld>
-  <p:clrMapOvr>
-    <a:masterClrMapping/>
-  </p:clrMapOvr>
-  <p:transition>
-    <p:fade/>
-  </p:transition>
-  <p:timing>
-    <p:tnLst>
-      <p:par>
-        <p:cTn id="1" dur="indefinite" restart="never" nodeType="tmRoot"/>
-      </p:par>
-    </p:tnLst>
-  </p:timing>
-</p:sld>
-</file>
-
-<file path=ppt/slides/slide16.xml><?xml version="1.0" encoding="utf-8"?>
-<p:sld xmlns:a="http://schemas.openxmlformats.org/drawingml/2006/main" xmlns:r="http://schemas.openxmlformats.org/officeDocument/2006/relationships" xmlns:p="http://schemas.openxmlformats.org/presentationml/2006/main">
-  <p:cSld>
-    <p:spTree>
-      <p:nvGrpSpPr>
-        <p:cNvPr id="1" name=""/>
-        <p:cNvGrpSpPr/>
-        <p:nvPr/>
-      </p:nvGrpSpPr>
-      <p:grpSpPr>
-        <a:xfrm>
-          <a:off x="0" y="0"/>
-          <a:ext cx="0" cy="0"/>
-          <a:chOff x="0" y="0"/>
-          <a:chExt cx="0" cy="0"/>
-        </a:xfrm>
-      </p:grpSpPr>
-      <p:sp>
-        <p:nvSpPr>
           <p:cNvPr id="3" name="Title 2"/>
           <p:cNvSpPr>
             <a:spLocks noGrp="1"/>
@@ -5551,7 +5436,7 @@
             <a:fld id="{FD0725B6-5DD5-4EEE-A0F0-572C51C8D44F}" type="slidenum">
               <a:rPr lang="en-US" smtClean="0"/>
               <a:pPr/>
-              <a:t>16</a:t>
+              <a:t>15</a:t>
             </a:fld>
             <a:endParaRPr lang="en-US"/>
           </a:p>
@@ -5606,7 +5491,7 @@
 </p:sld>
 </file>
 
-<file path=ppt/slides/slide17.xml><?xml version="1.0" encoding="utf-8"?>
+<file path=ppt/slides/slide16.xml><?xml version="1.0" encoding="utf-8"?>
 <p:sld xmlns:a="http://schemas.openxmlformats.org/drawingml/2006/main" xmlns:r="http://schemas.openxmlformats.org/officeDocument/2006/relationships" xmlns:p="http://schemas.openxmlformats.org/presentationml/2006/main">
   <p:cSld>
     <p:spTree>
@@ -5664,7 +5549,7 @@
             <a:fld id="{FD0725B6-5DD5-4EEE-A0F0-572C51C8D44F}" type="slidenum">
               <a:rPr lang="en-US" smtClean="0"/>
               <a:pPr/>
-              <a:t>17</a:t>
+              <a:t>16</a:t>
             </a:fld>
             <a:endParaRPr lang="en-US"/>
           </a:p>
@@ -5719,7 +5604,7 @@
 </p:sld>
 </file>
 
-<file path=ppt/slides/slide18.xml><?xml version="1.0" encoding="utf-8"?>
+<file path=ppt/slides/slide17.xml><?xml version="1.0" encoding="utf-8"?>
 <p:sld xmlns:a="http://schemas.openxmlformats.org/drawingml/2006/main" xmlns:r="http://schemas.openxmlformats.org/officeDocument/2006/relationships" xmlns:p="http://schemas.openxmlformats.org/presentationml/2006/main">
   <p:cSld>
     <p:spTree>
@@ -5777,7 +5662,7 @@
             <a:fld id="{FD0725B6-5DD5-4EEE-A0F0-572C51C8D44F}" type="slidenum">
               <a:rPr lang="en-US" smtClean="0"/>
               <a:pPr/>
-              <a:t>18</a:t>
+              <a:t>17</a:t>
             </a:fld>
             <a:endParaRPr lang="en-US"/>
           </a:p>
@@ -5832,7 +5717,7 @@
 </p:sld>
 </file>
 
-<file path=ppt/slides/slide19.xml><?xml version="1.0" encoding="utf-8"?>
+<file path=ppt/slides/slide18.xml><?xml version="1.0" encoding="utf-8"?>
 <p:sld xmlns:a="http://schemas.openxmlformats.org/drawingml/2006/main" xmlns:r="http://schemas.openxmlformats.org/officeDocument/2006/relationships" xmlns:p="http://schemas.openxmlformats.org/presentationml/2006/main">
   <p:cSld>
     <p:spTree>
@@ -5972,7 +5857,7 @@
             <a:fld id="{FD0725B6-5DD5-4EEE-A0F0-572C51C8D44F}" type="slidenum">
               <a:rPr lang="en-US" smtClean="0"/>
               <a:pPr/>
-              <a:t>19</a:t>
+              <a:t>18</a:t>
             </a:fld>
             <a:endParaRPr lang="en-US"/>
           </a:p>
@@ -5982,6 +5867,220 @@
     <p:extLst>
       <p:ext uri="{BB962C8B-B14F-4D97-AF65-F5344CB8AC3E}">
         <p14:creationId xmlns:p14="http://schemas.microsoft.com/office/powerpoint/2010/main" val="4044501857"/>
+      </p:ext>
+    </p:extLst>
+  </p:cSld>
+  <p:clrMapOvr>
+    <a:masterClrMapping/>
+  </p:clrMapOvr>
+  <p:transition>
+    <p:fade/>
+  </p:transition>
+  <p:timing>
+    <p:tnLst>
+      <p:par>
+        <p:cTn id="1" dur="indefinite" restart="never" nodeType="tmRoot"/>
+      </p:par>
+    </p:tnLst>
+  </p:timing>
+</p:sld>
+</file>
+
+<file path=ppt/slides/slide19.xml><?xml version="1.0" encoding="utf-8"?>
+<p:sld xmlns:a="http://schemas.openxmlformats.org/drawingml/2006/main" xmlns:r="http://schemas.openxmlformats.org/officeDocument/2006/relationships" xmlns:p="http://schemas.openxmlformats.org/presentationml/2006/main">
+  <p:cSld>
+    <p:spTree>
+      <p:nvGrpSpPr>
+        <p:cNvPr id="1" name=""/>
+        <p:cNvGrpSpPr/>
+        <p:nvPr/>
+      </p:nvGrpSpPr>
+      <p:grpSpPr>
+        <a:xfrm>
+          <a:off x="0" y="0"/>
+          <a:ext cx="0" cy="0"/>
+          <a:chOff x="0" y="0"/>
+          <a:chExt cx="0" cy="0"/>
+        </a:xfrm>
+      </p:grpSpPr>
+      <p:sp>
+        <p:nvSpPr>
+          <p:cNvPr id="2" name="Content Placeholder 1"/>
+          <p:cNvSpPr>
+            <a:spLocks noGrp="1"/>
+          </p:cNvSpPr>
+          <p:nvPr>
+            <p:ph idx="1"/>
+          </p:nvPr>
+        </p:nvSpPr>
+        <p:spPr>
+          <a:xfrm>
+            <a:off x="1270000" y="2438400"/>
+            <a:ext cx="10464800" cy="6959600"/>
+          </a:xfrm>
+        </p:spPr>
+        <p:txBody>
+          <a:bodyPr/>
+          <a:lstStyle/>
+          <a:p>
+            <a:pPr lvl="0">
+              <a:spcAft>
+                <a:spcPts val="600"/>
+              </a:spcAft>
+            </a:pPr>
+            <a:r>
+              <a:rPr lang="en-US" sz="3200" dirty="0"/>
+              <a:t>QA Highlights</a:t>
+            </a:r>
+          </a:p>
+          <a:p>
+            <a:pPr lvl="1">
+              <a:spcAft>
+                <a:spcPts val="600"/>
+              </a:spcAft>
+            </a:pPr>
+            <a:r>
+              <a:rPr lang="en-US" sz="2800" dirty="0"/>
+              <a:t>QA was part of requirement understanding discussions, application flow creation.</a:t>
+            </a:r>
+          </a:p>
+          <a:p>
+            <a:pPr lvl="1">
+              <a:spcAft>
+                <a:spcPts val="600"/>
+              </a:spcAft>
+            </a:pPr>
+            <a:r>
+              <a:rPr lang="en-US" sz="2800" dirty="0"/>
+              <a:t>Setting up of testing process within the </a:t>
+            </a:r>
+            <a:r>
+              <a:rPr lang="en-US" sz="2800" dirty="0" smtClean="0"/>
+              <a:t>sprint</a:t>
+            </a:r>
+          </a:p>
+          <a:p>
+            <a:pPr lvl="1">
+              <a:spcAft>
+                <a:spcPts val="600"/>
+              </a:spcAft>
+            </a:pPr>
+            <a:r>
+              <a:rPr lang="en-US" sz="2800" dirty="0" smtClean="0"/>
+              <a:t>Feature File and Test Scenario in BBD Format</a:t>
+            </a:r>
+            <a:endParaRPr lang="en-US" sz="2800" dirty="0"/>
+          </a:p>
+          <a:p>
+            <a:pPr>
+              <a:spcAft>
+                <a:spcPts val="600"/>
+              </a:spcAft>
+            </a:pPr>
+            <a:r>
+              <a:rPr lang="en-US" sz="3200" dirty="0" smtClean="0"/>
+              <a:t>Test </a:t>
+            </a:r>
+            <a:r>
+              <a:rPr lang="en-US" sz="3200" dirty="0"/>
+              <a:t>Plan </a:t>
+            </a:r>
+          </a:p>
+          <a:p>
+            <a:pPr lvl="1">
+              <a:spcAft>
+                <a:spcPts val="600"/>
+              </a:spcAft>
+            </a:pPr>
+            <a:r>
+              <a:rPr lang="en-US" sz="2800" dirty="0"/>
+              <a:t>Covering </a:t>
+            </a:r>
+            <a:r>
+              <a:rPr lang="en-US" sz="2800" dirty="0" smtClean="0"/>
+              <a:t>major </a:t>
+            </a:r>
+            <a:r>
+              <a:rPr lang="en-US" sz="2800" dirty="0"/>
+              <a:t>type of testing</a:t>
+            </a:r>
+          </a:p>
+          <a:p>
+            <a:pPr lvl="1">
+              <a:spcAft>
+                <a:spcPts val="600"/>
+              </a:spcAft>
+            </a:pPr>
+            <a:r>
+              <a:rPr lang="en-US" sz="2800" dirty="0"/>
+              <a:t>Strategy for every testing type</a:t>
+            </a:r>
+          </a:p>
+          <a:p>
+            <a:pPr marL="0" indent="0">
+              <a:spcAft>
+                <a:spcPts val="600"/>
+              </a:spcAft>
+              <a:buNone/>
+            </a:pPr>
+            <a:endParaRPr lang="en-US" sz="3600" dirty="0"/>
+          </a:p>
+        </p:txBody>
+      </p:sp>
+      <p:sp>
+        <p:nvSpPr>
+          <p:cNvPr id="3" name="Title 2"/>
+          <p:cNvSpPr>
+            <a:spLocks noGrp="1"/>
+          </p:cNvSpPr>
+          <p:nvPr>
+            <p:ph type="title"/>
+          </p:nvPr>
+        </p:nvSpPr>
+        <p:spPr/>
+        <p:txBody>
+          <a:bodyPr/>
+          <a:lstStyle/>
+          <a:p>
+            <a:r>
+              <a:rPr lang="en-US" dirty="0" smtClean="0"/>
+              <a:t>QA </a:t>
+            </a:r>
+            <a:r>
+              <a:rPr lang="en-US" dirty="0"/>
+              <a:t>Highlights</a:t>
+            </a:r>
+          </a:p>
+        </p:txBody>
+      </p:sp>
+      <p:sp>
+        <p:nvSpPr>
+          <p:cNvPr id="4" name="Slide Number Placeholder 3"/>
+          <p:cNvSpPr>
+            <a:spLocks noGrp="1"/>
+          </p:cNvSpPr>
+          <p:nvPr>
+            <p:ph type="sldNum" sz="quarter" idx="10"/>
+          </p:nvPr>
+        </p:nvSpPr>
+        <p:spPr/>
+        <p:txBody>
+          <a:bodyPr/>
+          <a:lstStyle/>
+          <a:p>
+            <a:fld id="{FD0725B6-5DD5-4EEE-A0F0-572C51C8D44F}" type="slidenum">
+              <a:rPr lang="en-US" smtClean="0"/>
+              <a:pPr/>
+              <a:t>19</a:t>
+            </a:fld>
+            <a:endParaRPr lang="en-US"/>
+          </a:p>
+        </p:txBody>
+      </p:sp>
+    </p:spTree>
+    <p:extLst>
+      <p:ext uri="{BB962C8B-B14F-4D97-AF65-F5344CB8AC3E}">
+        <p14:creationId xmlns:p14="http://schemas.microsoft.com/office/powerpoint/2010/main" val="794543978"/>
       </p:ext>
     </p:extLst>
   </p:cSld>
@@ -6677,8 +6776,8 @@
               </a:spcAft>
             </a:pPr>
             <a:r>
-              <a:rPr lang="en-US" sz="3200" dirty="0"/>
-              <a:t>QA Highlights</a:t>
+              <a:rPr lang="en-US" sz="3200" dirty="0" smtClean="0"/>
+              <a:t>Test Plan</a:t>
             </a:r>
           </a:p>
           <a:p>
@@ -6688,8 +6787,22 @@
               </a:spcAft>
             </a:pPr>
             <a:r>
-              <a:rPr lang="en-US" sz="2800" dirty="0"/>
-              <a:t>QA was part of requirement understanding discussions, application flow creation.</a:t>
+              <a:rPr lang="en-US" sz="2800" dirty="0">
+                <a:latin typeface="Times New Roman" pitchFamily="18" charset="0"/>
+                <a:cs typeface="Times New Roman" pitchFamily="18" charset="0"/>
+              </a:rPr>
+              <a:t>Covering major type of </a:t>
+            </a:r>
+            <a:r>
+              <a:rPr lang="en-US" sz="2800" dirty="0" smtClean="0">
+                <a:latin typeface="Times New Roman" pitchFamily="18" charset="0"/>
+                <a:cs typeface="Times New Roman" pitchFamily="18" charset="0"/>
+              </a:rPr>
+              <a:t>testing</a:t>
+            </a:r>
+            <a:r>
+              <a:rPr lang="en-US" sz="2800" dirty="0" smtClean="0"/>
+              <a:t>.</a:t>
             </a:r>
           </a:p>
           <a:p>
@@ -6699,12 +6812,8 @@
               </a:spcAft>
             </a:pPr>
             <a:r>
-              <a:rPr lang="en-US" sz="2800" dirty="0"/>
-              <a:t>Setting up of testing process within the </a:t>
-            </a:r>
-            <a:r>
               <a:rPr lang="en-US" sz="2800" dirty="0" smtClean="0"/>
-              <a:t>sprint</a:t>
+              <a:t>Strategy for every testing plan </a:t>
             </a:r>
           </a:p>
           <a:p>
@@ -6714,10 +6823,34 @@
               </a:spcAft>
             </a:pPr>
             <a:r>
-              <a:rPr lang="en-US" sz="2800" dirty="0" smtClean="0"/>
-              <a:t>Feature File and Test Scenario in BBD Format</a:t>
-            </a:r>
-            <a:endParaRPr lang="en-US" sz="2800" dirty="0"/>
+              <a:rPr lang="en-US" sz="2800" dirty="0">
+                <a:latin typeface="Times New Roman" pitchFamily="18" charset="0"/>
+                <a:cs typeface="Times New Roman" pitchFamily="18" charset="0"/>
+              </a:rPr>
+              <a:t>Defined Entry/Exit </a:t>
+            </a:r>
+            <a:r>
+              <a:rPr lang="en-US" sz="2800" dirty="0" smtClean="0">
+                <a:latin typeface="Times New Roman" pitchFamily="18" charset="0"/>
+                <a:cs typeface="Times New Roman" pitchFamily="18" charset="0"/>
+              </a:rPr>
+              <a:t>Criteria</a:t>
+            </a:r>
+          </a:p>
+          <a:p>
+            <a:pPr lvl="1">
+              <a:spcAft>
+                <a:spcPts val="600"/>
+              </a:spcAft>
+            </a:pPr>
+            <a:r>
+              <a:rPr lang="en-US" sz="2800" dirty="0">
+                <a:latin typeface="Times New Roman" pitchFamily="18" charset="0"/>
+                <a:cs typeface="Times New Roman" pitchFamily="18" charset="0"/>
+              </a:rPr>
+              <a:t>QA Policy and Test schedule </a:t>
+            </a:r>
+            <a:endParaRPr lang="en-US" sz="2800" dirty="0" smtClean="0"/>
           </a:p>
           <a:p>
             <a:pPr>
@@ -6727,11 +6860,7 @@
             </a:pPr>
             <a:r>
               <a:rPr lang="en-US" sz="3200" dirty="0" smtClean="0"/>
-              <a:t>Test </a:t>
-            </a:r>
-            <a:r>
-              <a:rPr lang="en-US" sz="3200" dirty="0"/>
-              <a:t>Plan </a:t>
+              <a:t>BDD Test Scenario/Test Cases </a:t>
             </a:r>
           </a:p>
           <a:p>
@@ -6741,16 +6870,32 @@
               </a:spcAft>
             </a:pPr>
             <a:r>
-              <a:rPr lang="en-US" sz="2800" dirty="0"/>
-              <a:t>Covering </a:t>
-            </a:r>
-            <a:r>
-              <a:rPr lang="en-US" sz="2800" dirty="0" smtClean="0"/>
-              <a:t>major </a:t>
-            </a:r>
-            <a:r>
-              <a:rPr lang="en-US" sz="2800" dirty="0"/>
-              <a:t>type of testing</a:t>
+              <a:rPr lang="en-US" sz="2800" dirty="0">
+                <a:latin typeface="Times New Roman" panose="02020603050405020304" pitchFamily="18" charset="0"/>
+                <a:cs typeface="Times New Roman" panose="02020603050405020304" pitchFamily="18" charset="0"/>
+              </a:rPr>
+              <a:t>Containing </a:t>
+            </a:r>
+            <a:r>
+              <a:rPr lang="en-US" sz="2800" dirty="0" smtClean="0">
+                <a:latin typeface="Times New Roman" panose="02020603050405020304" pitchFamily="18" charset="0"/>
+                <a:cs typeface="Times New Roman" panose="02020603050405020304" pitchFamily="18" charset="0"/>
+              </a:rPr>
+              <a:t>BDD Test Scenario/Test </a:t>
+            </a:r>
+            <a:r>
+              <a:rPr lang="en-US" sz="2800" dirty="0">
+                <a:latin typeface="Times New Roman" panose="02020603050405020304" pitchFamily="18" charset="0"/>
+                <a:cs typeface="Times New Roman" panose="02020603050405020304" pitchFamily="18" charset="0"/>
+              </a:rPr>
+              <a:t>cases for the functionalities </a:t>
+            </a:r>
+            <a:r>
+              <a:rPr lang="en-US" sz="2800" dirty="0" smtClean="0">
+                <a:latin typeface="Times New Roman" panose="02020603050405020304" pitchFamily="18" charset="0"/>
+                <a:cs typeface="Times New Roman" panose="02020603050405020304" pitchFamily="18" charset="0"/>
+              </a:rPr>
+              <a:t>implemented</a:t>
             </a:r>
           </a:p>
           <a:p>
@@ -6759,10 +6904,7 @@
                 <a:spcPts val="600"/>
               </a:spcAft>
             </a:pPr>
-            <a:r>
-              <a:rPr lang="en-US" sz="2800" dirty="0"/>
-              <a:t>Strategy for every testing type</a:t>
-            </a:r>
+            <a:endParaRPr lang="en-US" sz="2800" dirty="0" smtClean="0"/>
           </a:p>
           <a:p>
             <a:pPr marL="0" indent="0">
@@ -6785,7 +6927,12 @@
             <p:ph type="title"/>
           </p:nvPr>
         </p:nvSpPr>
-        <p:spPr/>
+        <p:spPr>
+          <a:xfrm>
+            <a:off x="1270000" y="76200"/>
+            <a:ext cx="10464800" cy="2032000"/>
+          </a:xfrm>
+        </p:spPr>
         <p:txBody>
           <a:bodyPr/>
           <a:lstStyle/>
@@ -6828,7 +6975,7 @@
     </p:spTree>
     <p:extLst>
       <p:ext uri="{BB962C8B-B14F-4D97-AF65-F5344CB8AC3E}">
-        <p14:creationId xmlns:p14="http://schemas.microsoft.com/office/powerpoint/2010/main" val="794543978"/>
+        <p14:creationId xmlns:p14="http://schemas.microsoft.com/office/powerpoint/2010/main" val="2791584546"/>
       </p:ext>
     </p:extLst>
   </p:cSld>
@@ -6875,160 +7022,129 @@
             <p:ph idx="1"/>
           </p:nvPr>
         </p:nvSpPr>
-        <p:spPr>
-          <a:xfrm>
-            <a:off x="1270000" y="2438400"/>
-            <a:ext cx="10464800" cy="6959600"/>
-          </a:xfrm>
-        </p:spPr>
+        <p:spPr/>
         <p:txBody>
           <a:bodyPr/>
           <a:lstStyle/>
           <a:p>
-            <a:pPr lvl="0">
-              <a:spcAft>
-                <a:spcPts val="600"/>
-              </a:spcAft>
-            </a:pPr>
+            <a:r>
+              <a:rPr lang="en-US" sz="3200" dirty="0"/>
+              <a:t>Total </a:t>
+            </a:r>
             <a:r>
               <a:rPr lang="en-US" sz="3200" dirty="0" smtClean="0"/>
-              <a:t>Test Plan</a:t>
-            </a:r>
-          </a:p>
-          <a:p>
-            <a:pPr lvl="1">
-              <a:spcAft>
-                <a:spcPts val="600"/>
-              </a:spcAft>
-            </a:pPr>
-            <a:r>
-              <a:rPr lang="en-US" sz="2800" dirty="0">
+              <a:t>BDD Features File : </a:t>
+            </a:r>
+            <a:r>
+              <a:rPr lang="en-US" sz="3200" dirty="0"/>
+              <a:t>5</a:t>
+            </a:r>
+            <a:endParaRPr lang="en-US" sz="3200" dirty="0" smtClean="0"/>
+          </a:p>
+          <a:p>
+            <a:r>
+              <a:rPr lang="en-US" sz="3200" dirty="0" smtClean="0"/>
+              <a:t>Total Number of Scenarios in each feature files</a:t>
+            </a:r>
+          </a:p>
+          <a:p>
+            <a:pPr lvl="1"/>
+            <a:r>
+              <a:rPr lang="en-US" sz="3200" dirty="0" err="1"/>
+              <a:t>ServiceAggregator_Registration.feature</a:t>
+            </a:r>
+            <a:r>
+              <a:rPr lang="en-US" sz="3200" dirty="0"/>
+              <a:t> </a:t>
+            </a:r>
+            <a:r>
+              <a:rPr lang="en-US" sz="3200" dirty="0" smtClean="0"/>
+              <a:t>:7</a:t>
+            </a:r>
+            <a:endParaRPr lang="en-US" sz="3200" dirty="0"/>
+          </a:p>
+          <a:p>
+            <a:pPr lvl="1"/>
+            <a:r>
+              <a:rPr lang="en-US" sz="3200" dirty="0" smtClean="0"/>
+              <a:t>Service_Platform_Admin_Portal.feature:7</a:t>
+            </a:r>
+          </a:p>
+          <a:p>
+            <a:pPr lvl="1"/>
+            <a:r>
+              <a:rPr lang="en-US" sz="3200" dirty="0" err="1"/>
+              <a:t>Service_Platform_Dashboard.feature</a:t>
+            </a:r>
+            <a:r>
+              <a:rPr lang="en-US" sz="3200" dirty="0"/>
+              <a:t> </a:t>
+            </a:r>
+            <a:r>
+              <a:rPr lang="en-US" sz="3200" dirty="0" smtClean="0"/>
+              <a:t>:2</a:t>
+            </a:r>
+          </a:p>
+          <a:p>
+            <a:pPr lvl="1"/>
+            <a:r>
+              <a:rPr lang="en-US" sz="3200" dirty="0" err="1" smtClean="0"/>
+              <a:t>Service_Platform_Login.feature</a:t>
+            </a:r>
+            <a:r>
+              <a:rPr lang="en-US" sz="3200" dirty="0" smtClean="0"/>
+              <a:t>: 6</a:t>
+            </a:r>
+          </a:p>
+          <a:p>
+            <a:pPr lvl="1"/>
+            <a:r>
+              <a:rPr lang="en-US" sz="3200" dirty="0" smtClean="0"/>
+              <a:t>Service_Platform_Zipped_Download.feature:4</a:t>
+            </a:r>
+          </a:p>
+          <a:p>
+            <a:r>
+              <a:rPr lang="en-US" sz="3200" dirty="0"/>
+              <a:t>Automation</a:t>
+            </a:r>
+          </a:p>
+          <a:p>
+            <a:pPr lvl="1"/>
+            <a:r>
+              <a:rPr lang="en-US" altLang="ja-JP" sz="3200" dirty="0">
                 <a:latin typeface="Times New Roman" pitchFamily="18" charset="0"/>
+                <a:ea typeface="ヒラギノ角ゴ ProN W3" charset="0"/>
                 <a:cs typeface="Times New Roman" pitchFamily="18" charset="0"/>
               </a:rPr>
-              <a:t>Covering major type of </a:t>
-            </a:r>
-            <a:r>
-              <a:rPr lang="en-US" sz="2800" dirty="0" smtClean="0">
-                <a:latin typeface="Times New Roman" pitchFamily="18" charset="0"/>
-                <a:cs typeface="Times New Roman" pitchFamily="18" charset="0"/>
-              </a:rPr>
-              <a:t>testing</a:t>
-            </a:r>
-            <a:r>
-              <a:rPr lang="en-US" sz="2800" dirty="0" smtClean="0"/>
-              <a:t>.</a:t>
-            </a:r>
-          </a:p>
-          <a:p>
-            <a:pPr lvl="1">
-              <a:spcAft>
-                <a:spcPts val="600"/>
-              </a:spcAft>
-            </a:pPr>
-            <a:r>
-              <a:rPr lang="en-US" sz="2800" dirty="0" smtClean="0"/>
-              <a:t>Strategy for every testing plan </a:t>
-            </a:r>
-          </a:p>
-          <a:p>
-            <a:pPr lvl="1">
-              <a:spcAft>
-                <a:spcPts val="600"/>
-              </a:spcAft>
-            </a:pPr>
-            <a:r>
-              <a:rPr lang="en-US" sz="2800" dirty="0">
-                <a:latin typeface="Times New Roman" pitchFamily="18" charset="0"/>
-                <a:cs typeface="Times New Roman" pitchFamily="18" charset="0"/>
-              </a:rPr>
-              <a:t>Defined Entry/Exit </a:t>
-            </a:r>
-            <a:r>
-              <a:rPr lang="en-US" sz="2800" dirty="0" smtClean="0">
-                <a:latin typeface="Times New Roman" pitchFamily="18" charset="0"/>
-                <a:cs typeface="Times New Roman" pitchFamily="18" charset="0"/>
-              </a:rPr>
-              <a:t>Criteria</a:t>
-            </a:r>
-          </a:p>
-          <a:p>
-            <a:pPr lvl="1">
-              <a:spcAft>
-                <a:spcPts val="600"/>
-              </a:spcAft>
-            </a:pPr>
-            <a:r>
-              <a:rPr lang="en-US" sz="2800" dirty="0">
-                <a:latin typeface="Times New Roman" pitchFamily="18" charset="0"/>
-                <a:cs typeface="Times New Roman" pitchFamily="18" charset="0"/>
-              </a:rPr>
-              <a:t>QA Policy and Test schedule </a:t>
-            </a:r>
-            <a:endParaRPr lang="en-US" sz="2800" dirty="0" smtClean="0"/>
-          </a:p>
-          <a:p>
-            <a:pPr>
-              <a:spcAft>
-                <a:spcPts val="600"/>
-              </a:spcAft>
-            </a:pPr>
-            <a:r>
-              <a:rPr lang="en-US" sz="3200" dirty="0" smtClean="0"/>
-              <a:t>BDD Test Scenario/Test Cases </a:t>
-            </a:r>
-          </a:p>
-          <a:p>
-            <a:pPr lvl="1">
-              <a:spcAft>
-                <a:spcPts val="600"/>
-              </a:spcAft>
-            </a:pPr>
-            <a:r>
-              <a:rPr lang="en-US" sz="2800" dirty="0">
-                <a:latin typeface="Times New Roman" panose="02020603050405020304" pitchFamily="18" charset="0"/>
-                <a:cs typeface="Times New Roman" panose="02020603050405020304" pitchFamily="18" charset="0"/>
-              </a:rPr>
-              <a:t>Containing </a:t>
-            </a:r>
-            <a:r>
-              <a:rPr lang="en-US" sz="2800" dirty="0" smtClean="0">
-                <a:latin typeface="Times New Roman" panose="02020603050405020304" pitchFamily="18" charset="0"/>
-                <a:cs typeface="Times New Roman" panose="02020603050405020304" pitchFamily="18" charset="0"/>
-              </a:rPr>
-              <a:t>BDD Test Scenario/Test </a:t>
-            </a:r>
-            <a:r>
-              <a:rPr lang="en-US" sz="2800" dirty="0">
-                <a:latin typeface="Times New Roman" panose="02020603050405020304" pitchFamily="18" charset="0"/>
-                <a:cs typeface="Times New Roman" panose="02020603050405020304" pitchFamily="18" charset="0"/>
-              </a:rPr>
-              <a:t>cases for the functionalities </a:t>
-            </a:r>
-            <a:r>
-              <a:rPr lang="en-US" sz="2800" dirty="0" smtClean="0">
-                <a:latin typeface="Times New Roman" panose="02020603050405020304" pitchFamily="18" charset="0"/>
-                <a:cs typeface="Times New Roman" panose="02020603050405020304" pitchFamily="18" charset="0"/>
-              </a:rPr>
-              <a:t>implemented</a:t>
-            </a:r>
-          </a:p>
-          <a:p>
-            <a:pPr lvl="1">
-              <a:spcAft>
-                <a:spcPts val="600"/>
-              </a:spcAft>
-            </a:pPr>
-            <a:endParaRPr lang="en-US" sz="2800" dirty="0" smtClean="0"/>
-          </a:p>
-          <a:p>
-            <a:pPr marL="0" indent="0">
-              <a:spcAft>
-                <a:spcPts val="600"/>
-              </a:spcAft>
+              <a:t>Automation framework Document</a:t>
+            </a:r>
+          </a:p>
+          <a:p>
+            <a:pPr marL="571500" lvl="1" indent="0">
               <a:buNone/>
             </a:pPr>
-            <a:endParaRPr lang="en-US" sz="3600" dirty="0"/>
+            <a:endParaRPr lang="en-US" sz="3200" dirty="0" smtClean="0"/>
+          </a:p>
+          <a:p>
+            <a:pPr marL="571500" lvl="1" indent="0">
+              <a:buNone/>
+            </a:pPr>
+            <a:endParaRPr lang="en-US" sz="3200" dirty="0" smtClean="0"/>
+          </a:p>
+          <a:p>
+            <a:pPr lvl="1"/>
+            <a:endParaRPr lang="en-US" sz="3200" dirty="0"/>
+          </a:p>
+          <a:p>
+            <a:pPr lvl="1"/>
+            <a:endParaRPr lang="en-US" sz="3200" dirty="0" smtClean="0"/>
+          </a:p>
+          <a:p>
+            <a:pPr marL="0" indent="0">
+              <a:buNone/>
+            </a:pPr>
+            <a:endParaRPr lang="en-US" sz="3200" dirty="0"/>
           </a:p>
         </p:txBody>
       </p:sp>
@@ -7042,24 +7158,16 @@
             <p:ph type="title"/>
           </p:nvPr>
         </p:nvSpPr>
-        <p:spPr>
-          <a:xfrm>
-            <a:off x="1270000" y="76200"/>
-            <a:ext cx="10464800" cy="2032000"/>
-          </a:xfrm>
-        </p:spPr>
+        <p:spPr/>
         <p:txBody>
           <a:bodyPr/>
           <a:lstStyle/>
           <a:p>
             <a:r>
               <a:rPr lang="en-US" dirty="0" smtClean="0"/>
-              <a:t>QA </a:t>
-            </a:r>
-            <a:r>
-              <a:rPr lang="en-US" dirty="0"/>
-              <a:t>Highlights</a:t>
-            </a:r>
+              <a:t>QA Highlights</a:t>
+            </a:r>
+            <a:endParaRPr lang="en-US" dirty="0"/>
           </a:p>
         </p:txBody>
       </p:sp>
@@ -7090,7 +7198,7 @@
     </p:spTree>
     <p:extLst>
       <p:ext uri="{BB962C8B-B14F-4D97-AF65-F5344CB8AC3E}">
-        <p14:creationId xmlns:p14="http://schemas.microsoft.com/office/powerpoint/2010/main" val="2791584546"/>
+        <p14:creationId xmlns:p14="http://schemas.microsoft.com/office/powerpoint/2010/main" val="4255829178"/>
       </p:ext>
     </p:extLst>
   </p:cSld>
@@ -7143,97 +7251,26 @@
           <a:lstStyle/>
           <a:p>
             <a:r>
-              <a:rPr lang="en-US" sz="3200" dirty="0"/>
-              <a:t>Total </a:t>
-            </a:r>
-            <a:r>
               <a:rPr lang="en-US" sz="3200" dirty="0" smtClean="0"/>
-              <a:t>BDD Features File : </a:t>
-            </a:r>
-            <a:r>
-              <a:rPr lang="en-US" sz="3200" dirty="0"/>
-              <a:t>5</a:t>
-            </a:r>
-            <a:endParaRPr lang="en-US" sz="3200" dirty="0" smtClean="0"/>
+              <a:t>Improvement in right feature files in BDD format.</a:t>
+            </a:r>
           </a:p>
           <a:p>
             <a:r>
               <a:rPr lang="en-US" sz="3200" dirty="0" smtClean="0"/>
-              <a:t>Total Number of Scenarios in each feature files</a:t>
-            </a:r>
-          </a:p>
-          <a:p>
-            <a:pPr lvl="1"/>
-            <a:r>
-              <a:rPr lang="en-US" sz="3200" dirty="0" err="1"/>
-              <a:t>ServiceAggregator_Registration.feature</a:t>
-            </a:r>
-            <a:r>
-              <a:rPr lang="en-US" sz="3200" dirty="0"/>
-              <a:t> </a:t>
-            </a:r>
-            <a:r>
-              <a:rPr lang="en-US" sz="3200" dirty="0" smtClean="0"/>
-              <a:t>:7</a:t>
+              <a:t>Customized Cucumber Report.</a:t>
             </a:r>
             <a:endParaRPr lang="en-US" sz="3200" dirty="0"/>
           </a:p>
           <a:p>
-            <a:pPr lvl="1"/>
-            <a:r>
-              <a:rPr lang="en-US" sz="3200" dirty="0" smtClean="0"/>
-              <a:t>Service_Platform_Admin_Portal.feature:7</a:t>
-            </a:r>
-          </a:p>
-          <a:p>
-            <a:pPr lvl="1"/>
-            <a:r>
-              <a:rPr lang="en-US" sz="3200" dirty="0" err="1"/>
-              <a:t>Service_Platform_Dashboard.feature</a:t>
-            </a:r>
-            <a:r>
-              <a:rPr lang="en-US" sz="3200" dirty="0"/>
-              <a:t> </a:t>
-            </a:r>
-            <a:r>
-              <a:rPr lang="en-US" sz="3200" dirty="0" smtClean="0"/>
-              <a:t>:2</a:t>
-            </a:r>
-          </a:p>
-          <a:p>
-            <a:pPr lvl="1"/>
-            <a:r>
-              <a:rPr lang="en-US" sz="3200" dirty="0" err="1" smtClean="0"/>
-              <a:t>Service_Platform_Login.feature</a:t>
-            </a:r>
-            <a:r>
-              <a:rPr lang="en-US" sz="3200" dirty="0" smtClean="0"/>
-              <a:t>: 6</a:t>
-            </a:r>
-          </a:p>
-          <a:p>
-            <a:pPr lvl="1"/>
-            <a:r>
-              <a:rPr lang="en-US" sz="3200" dirty="0" smtClean="0"/>
-              <a:t>Service_Platform_Zipped_Download.feature:4</a:t>
-            </a:r>
-          </a:p>
-          <a:p>
-            <a:r>
-              <a:rPr lang="en-US" sz="3200" dirty="0"/>
-              <a:t>Automation</a:t>
-            </a:r>
-          </a:p>
-          <a:p>
-            <a:pPr lvl="1"/>
-            <a:r>
-              <a:rPr lang="en-US" altLang="ja-JP" sz="3200" dirty="0">
-                <a:latin typeface="Times New Roman" pitchFamily="18" charset="0"/>
-                <a:ea typeface="ヒラギノ角ゴ ProN W3" charset="0"/>
-                <a:cs typeface="Times New Roman" pitchFamily="18" charset="0"/>
-              </a:rPr>
-              <a:t>Automation framework Document</a:t>
-            </a:r>
+            <a:pPr marL="571500" lvl="1" indent="0">
+              <a:buNone/>
+            </a:pPr>
+            <a:endParaRPr lang="en-US" altLang="ja-JP" sz="3200" dirty="0">
+              <a:latin typeface="Times New Roman" pitchFamily="18" charset="0"/>
+              <a:ea typeface="ヒラギノ角ゴ ProN W3" charset="0"/>
+              <a:cs typeface="Times New Roman" pitchFamily="18" charset="0"/>
+            </a:endParaRPr>
           </a:p>
           <a:p>
             <a:pPr marL="571500" lvl="1" indent="0">
@@ -7280,7 +7317,7 @@
           <a:p>
             <a:r>
               <a:rPr lang="en-US" dirty="0" smtClean="0"/>
-              <a:t>QA Highlights</a:t>
+              <a:t>Area of Improvement</a:t>
             </a:r>
             <a:endParaRPr lang="en-US" dirty="0"/>
           </a:p>
@@ -7313,7 +7350,7 @@
     </p:spTree>
     <p:extLst>
       <p:ext uri="{BB962C8B-B14F-4D97-AF65-F5344CB8AC3E}">
-        <p14:creationId xmlns:p14="http://schemas.microsoft.com/office/powerpoint/2010/main" val="4255829178"/>
+        <p14:creationId xmlns:p14="http://schemas.microsoft.com/office/powerpoint/2010/main" val="273424273"/>
       </p:ext>
     </p:extLst>
   </p:cSld>
@@ -7366,52 +7403,50 @@
           <a:lstStyle/>
           <a:p>
             <a:r>
+              <a:rPr lang="en-US" sz="3200" dirty="0"/>
+              <a:t>Total Sprints = </a:t>
+            </a:r>
+            <a:r>
               <a:rPr lang="en-US" sz="3200" dirty="0" smtClean="0"/>
-              <a:t>Improvement in right feature files in BDD format.</a:t>
-            </a:r>
+              <a:t>5</a:t>
+            </a:r>
+            <a:endParaRPr lang="en-US" sz="3200" dirty="0"/>
           </a:p>
           <a:p>
             <a:r>
               <a:rPr lang="en-US" sz="3200" dirty="0" smtClean="0"/>
-              <a:t>Customized Cucumber Report.</a:t>
-            </a:r>
-            <a:endParaRPr lang="en-US" sz="3200" dirty="0"/>
-          </a:p>
-          <a:p>
-            <a:pPr marL="571500" lvl="1" indent="0">
-              <a:buNone/>
-            </a:pPr>
-            <a:endParaRPr lang="en-US" altLang="ja-JP" sz="3200" dirty="0">
-              <a:latin typeface="Times New Roman" pitchFamily="18" charset="0"/>
-              <a:ea typeface="ヒラギノ角ゴ ProN W3" charset="0"/>
-              <a:cs typeface="Times New Roman" pitchFamily="18" charset="0"/>
-            </a:endParaRPr>
-          </a:p>
-          <a:p>
-            <a:pPr marL="571500" lvl="1" indent="0">
-              <a:buNone/>
-            </a:pPr>
-            <a:endParaRPr lang="en-US" sz="3200" dirty="0" smtClean="0"/>
-          </a:p>
-          <a:p>
-            <a:pPr marL="571500" lvl="1" indent="0">
-              <a:buNone/>
-            </a:pPr>
-            <a:endParaRPr lang="en-US" sz="3200" dirty="0" smtClean="0"/>
-          </a:p>
-          <a:p>
-            <a:pPr lvl="1"/>
-            <a:endParaRPr lang="en-US" sz="3200" dirty="0"/>
-          </a:p>
-          <a:p>
-            <a:pPr lvl="1"/>
-            <a:endParaRPr lang="en-US" sz="3200" dirty="0" smtClean="0"/>
-          </a:p>
-          <a:p>
-            <a:pPr marL="0" indent="0">
-              <a:buNone/>
-            </a:pPr>
-            <a:endParaRPr lang="en-US" sz="3200" dirty="0"/>
+              <a:t>User </a:t>
+            </a:r>
+            <a:r>
+              <a:rPr lang="en-US" sz="3200" dirty="0"/>
+              <a:t>S</a:t>
+            </a:r>
+            <a:r>
+              <a:rPr lang="en-US" sz="3200" dirty="0" smtClean="0"/>
+              <a:t>tories </a:t>
+            </a:r>
+            <a:r>
+              <a:rPr lang="en-US" sz="3200" dirty="0"/>
+              <a:t>= </a:t>
+            </a:r>
+            <a:r>
+              <a:rPr lang="en-US" sz="3200" dirty="0" smtClean="0"/>
+              <a:t>58</a:t>
+            </a:r>
+          </a:p>
+          <a:p>
+            <a:r>
+              <a:rPr lang="en-US" sz="3200" dirty="0" smtClean="0"/>
+              <a:t>Average </a:t>
+            </a:r>
+            <a:r>
+              <a:rPr lang="en-US" sz="3200" dirty="0"/>
+              <a:t>Sprint  Velocity </a:t>
+            </a:r>
+            <a:r>
+              <a:rPr lang="en-US" sz="3200" dirty="0" smtClean="0"/>
+              <a:t>=64</a:t>
+            </a:r>
           </a:p>
         </p:txBody>
       </p:sp>
@@ -7432,7 +7467,7 @@
           <a:p>
             <a:r>
               <a:rPr lang="en-US" dirty="0" smtClean="0"/>
-              <a:t>Area of Improvement</a:t>
+              <a:t>Project Metrics</a:t>
             </a:r>
             <a:endParaRPr lang="en-US" dirty="0"/>
           </a:p>
@@ -7465,7 +7500,7 @@
     </p:spTree>
     <p:extLst>
       <p:ext uri="{BB962C8B-B14F-4D97-AF65-F5344CB8AC3E}">
-        <p14:creationId xmlns:p14="http://schemas.microsoft.com/office/powerpoint/2010/main" val="273424273"/>
+        <p14:creationId xmlns:p14="http://schemas.microsoft.com/office/powerpoint/2010/main" val="3429132619"/>
       </p:ext>
     </p:extLst>
   </p:cSld>
@@ -7517,51 +7552,11 @@
           <a:bodyPr/>
           <a:lstStyle/>
           <a:p>
-            <a:r>
-              <a:rPr lang="en-US" sz="3200" dirty="0"/>
-              <a:t>Total Sprints = </a:t>
-            </a:r>
-            <a:r>
-              <a:rPr lang="en-US" sz="3200" dirty="0" smtClean="0"/>
-              <a:t>5</a:t>
-            </a:r>
+            <a:pPr lvl="0"/>
+            <a:endParaRPr lang="en-US" sz="3200" dirty="0" smtClean="0"/>
+          </a:p>
+          <a:p>
             <a:endParaRPr lang="en-US" sz="3200" dirty="0"/>
-          </a:p>
-          <a:p>
-            <a:r>
-              <a:rPr lang="en-US" sz="3200" dirty="0" smtClean="0"/>
-              <a:t>User </a:t>
-            </a:r>
-            <a:r>
-              <a:rPr lang="en-US" sz="3200" dirty="0"/>
-              <a:t>S</a:t>
-            </a:r>
-            <a:r>
-              <a:rPr lang="en-US" sz="3200" dirty="0" smtClean="0"/>
-              <a:t>tories </a:t>
-            </a:r>
-            <a:r>
-              <a:rPr lang="en-US" sz="3200" dirty="0"/>
-              <a:t>= </a:t>
-            </a:r>
-            <a:r>
-              <a:rPr lang="en-US" sz="3200" dirty="0" smtClean="0"/>
-              <a:t>58</a:t>
-            </a:r>
-          </a:p>
-          <a:p>
-            <a:r>
-              <a:rPr lang="en-US" sz="3200" dirty="0" smtClean="0"/>
-              <a:t>Average </a:t>
-            </a:r>
-            <a:r>
-              <a:rPr lang="en-US" sz="3200" dirty="0"/>
-              <a:t>Sprint  Velocity </a:t>
-            </a:r>
-            <a:r>
-              <a:rPr lang="en-US" sz="3200" dirty="0" smtClean="0"/>
-              <a:t>=64</a:t>
-            </a:r>
           </a:p>
         </p:txBody>
       </p:sp>
@@ -7581,8 +7576,8 @@
           <a:lstStyle/>
           <a:p>
             <a:r>
-              <a:rPr lang="en-US" dirty="0" smtClean="0"/>
-              <a:t>Project Metrics</a:t>
+              <a:rPr lang="en-US" sz="5400" dirty="0" smtClean="0"/>
+              <a:t>Scrum Tool – Agile Scrum Sheet</a:t>
             </a:r>
             <a:endParaRPr lang="en-US" dirty="0"/>
           </a:p>
@@ -7612,10 +7607,67 @@
           </a:p>
         </p:txBody>
       </p:sp>
+      <p:sp>
+        <p:nvSpPr>
+          <p:cNvPr id="6" name="TextBox 5"/>
+          <p:cNvSpPr txBox="1"/>
+          <p:nvPr/>
+        </p:nvSpPr>
+        <p:spPr>
+          <a:xfrm>
+            <a:off x="1315558" y="2743200"/>
+            <a:ext cx="1986442" cy="738664"/>
+          </a:xfrm>
+          <a:prstGeom prst="rect">
+            <a:avLst/>
+          </a:prstGeom>
+          <a:noFill/>
+        </p:spPr>
+        <p:txBody>
+          <a:bodyPr wrap="none" rtlCol="0">
+            <a:spAutoFit/>
+          </a:bodyPr>
+          <a:lstStyle/>
+          <a:p>
+            <a:r>
+              <a:rPr lang="en-US" dirty="0" smtClean="0"/>
+              <a:t>Sprint </a:t>
+            </a:r>
+            <a:r>
+              <a:rPr lang="en-US" dirty="0"/>
+              <a:t>0</a:t>
+            </a:r>
+          </a:p>
+        </p:txBody>
+      </p:sp>
+      <p:pic>
+        <p:nvPicPr>
+          <p:cNvPr id="5" name="Picture 4"/>
+          <p:cNvPicPr>
+            <a:picLocks noChangeAspect="1"/>
+          </p:cNvPicPr>
+          <p:nvPr/>
+        </p:nvPicPr>
+        <p:blipFill>
+          <a:blip r:embed="rId2"/>
+          <a:stretch>
+            <a:fillRect/>
+          </a:stretch>
+        </p:blipFill>
+        <p:spPr>
+          <a:xfrm>
+            <a:off x="711200" y="3735864"/>
+            <a:ext cx="11506200" cy="5715000"/>
+          </a:xfrm>
+          <a:prstGeom prst="rect">
+            <a:avLst/>
+          </a:prstGeom>
+        </p:spPr>
+      </p:pic>
     </p:spTree>
     <p:extLst>
       <p:ext uri="{BB962C8B-B14F-4D97-AF65-F5344CB8AC3E}">
-        <p14:creationId xmlns:p14="http://schemas.microsoft.com/office/powerpoint/2010/main" val="3429132619"/>
+        <p14:creationId xmlns:p14="http://schemas.microsoft.com/office/powerpoint/2010/main" val="3274724306"/>
       </p:ext>
     </p:extLst>
   </p:cSld>
@@ -7691,7 +7743,7 @@
           <a:lstStyle/>
           <a:p>
             <a:r>
-              <a:rPr lang="en-US" sz="5400" dirty="0" smtClean="0"/>
+              <a:rPr lang="en-US" sz="5400" dirty="0"/>
               <a:t>Scrum Tool – Agile Scrum Sheet</a:t>
             </a:r>
             <a:endParaRPr lang="en-US" dirty="0"/>
@@ -7717,173 +7769,6 @@
               <a:rPr lang="en-US" smtClean="0"/>
               <a:pPr/>
               <a:t>25</a:t>
-            </a:fld>
-            <a:endParaRPr lang="en-US"/>
-          </a:p>
-        </p:txBody>
-      </p:sp>
-      <p:sp>
-        <p:nvSpPr>
-          <p:cNvPr id="6" name="TextBox 5"/>
-          <p:cNvSpPr txBox="1"/>
-          <p:nvPr/>
-        </p:nvSpPr>
-        <p:spPr>
-          <a:xfrm>
-            <a:off x="1315558" y="2743200"/>
-            <a:ext cx="1986442" cy="738664"/>
-          </a:xfrm>
-          <a:prstGeom prst="rect">
-            <a:avLst/>
-          </a:prstGeom>
-          <a:noFill/>
-        </p:spPr>
-        <p:txBody>
-          <a:bodyPr wrap="none" rtlCol="0">
-            <a:spAutoFit/>
-          </a:bodyPr>
-          <a:lstStyle/>
-          <a:p>
-            <a:r>
-              <a:rPr lang="en-US" dirty="0" smtClean="0"/>
-              <a:t>Sprint </a:t>
-            </a:r>
-            <a:r>
-              <a:rPr lang="en-US" dirty="0"/>
-              <a:t>0</a:t>
-            </a:r>
-          </a:p>
-        </p:txBody>
-      </p:sp>
-      <p:pic>
-        <p:nvPicPr>
-          <p:cNvPr id="5" name="Picture 4"/>
-          <p:cNvPicPr>
-            <a:picLocks noChangeAspect="1"/>
-          </p:cNvPicPr>
-          <p:nvPr/>
-        </p:nvPicPr>
-        <p:blipFill>
-          <a:blip r:embed="rId2"/>
-          <a:stretch>
-            <a:fillRect/>
-          </a:stretch>
-        </p:blipFill>
-        <p:spPr>
-          <a:xfrm>
-            <a:off x="711200" y="3735864"/>
-            <a:ext cx="11506200" cy="5715000"/>
-          </a:xfrm>
-          <a:prstGeom prst="rect">
-            <a:avLst/>
-          </a:prstGeom>
-        </p:spPr>
-      </p:pic>
-    </p:spTree>
-    <p:extLst>
-      <p:ext uri="{BB962C8B-B14F-4D97-AF65-F5344CB8AC3E}">
-        <p14:creationId xmlns:p14="http://schemas.microsoft.com/office/powerpoint/2010/main" val="3274724306"/>
-      </p:ext>
-    </p:extLst>
-  </p:cSld>
-  <p:clrMapOvr>
-    <a:masterClrMapping/>
-  </p:clrMapOvr>
-  <p:transition>
-    <p:fade/>
-  </p:transition>
-  <p:timing>
-    <p:tnLst>
-      <p:par>
-        <p:cTn id="1" dur="indefinite" restart="never" nodeType="tmRoot"/>
-      </p:par>
-    </p:tnLst>
-  </p:timing>
-</p:sld>
-</file>
-
-<file path=ppt/slides/slide26.xml><?xml version="1.0" encoding="utf-8"?>
-<p:sld xmlns:a="http://schemas.openxmlformats.org/drawingml/2006/main" xmlns:r="http://schemas.openxmlformats.org/officeDocument/2006/relationships" xmlns:p="http://schemas.openxmlformats.org/presentationml/2006/main">
-  <p:cSld>
-    <p:spTree>
-      <p:nvGrpSpPr>
-        <p:cNvPr id="1" name=""/>
-        <p:cNvGrpSpPr/>
-        <p:nvPr/>
-      </p:nvGrpSpPr>
-      <p:grpSpPr>
-        <a:xfrm>
-          <a:off x="0" y="0"/>
-          <a:ext cx="0" cy="0"/>
-          <a:chOff x="0" y="0"/>
-          <a:chExt cx="0" cy="0"/>
-        </a:xfrm>
-      </p:grpSpPr>
-      <p:sp>
-        <p:nvSpPr>
-          <p:cNvPr id="2" name="Content Placeholder 1"/>
-          <p:cNvSpPr>
-            <a:spLocks noGrp="1"/>
-          </p:cNvSpPr>
-          <p:nvPr>
-            <p:ph idx="1"/>
-          </p:nvPr>
-        </p:nvSpPr>
-        <p:spPr/>
-        <p:txBody>
-          <a:bodyPr/>
-          <a:lstStyle/>
-          <a:p>
-            <a:pPr lvl="0"/>
-            <a:endParaRPr lang="en-US" sz="3200" dirty="0" smtClean="0"/>
-          </a:p>
-          <a:p>
-            <a:endParaRPr lang="en-US" sz="3200" dirty="0"/>
-          </a:p>
-        </p:txBody>
-      </p:sp>
-      <p:sp>
-        <p:nvSpPr>
-          <p:cNvPr id="3" name="Title 2"/>
-          <p:cNvSpPr>
-            <a:spLocks noGrp="1"/>
-          </p:cNvSpPr>
-          <p:nvPr>
-            <p:ph type="title"/>
-          </p:nvPr>
-        </p:nvSpPr>
-        <p:spPr/>
-        <p:txBody>
-          <a:bodyPr/>
-          <a:lstStyle/>
-          <a:p>
-            <a:r>
-              <a:rPr lang="en-US" sz="5400" dirty="0"/>
-              <a:t>Scrum Tool – Agile Scrum Sheet</a:t>
-            </a:r>
-            <a:endParaRPr lang="en-US" dirty="0"/>
-          </a:p>
-        </p:txBody>
-      </p:sp>
-      <p:sp>
-        <p:nvSpPr>
-          <p:cNvPr id="4" name="Slide Number Placeholder 3"/>
-          <p:cNvSpPr>
-            <a:spLocks noGrp="1"/>
-          </p:cNvSpPr>
-          <p:nvPr>
-            <p:ph type="sldNum" sz="quarter" idx="10"/>
-          </p:nvPr>
-        </p:nvSpPr>
-        <p:spPr/>
-        <p:txBody>
-          <a:bodyPr/>
-          <a:lstStyle/>
-          <a:p>
-            <a:fld id="{FD0725B6-5DD5-4EEE-A0F0-572C51C8D44F}" type="slidenum">
-              <a:rPr lang="en-US" smtClean="0"/>
-              <a:pPr/>
-              <a:t>26</a:t>
             </a:fld>
             <a:endParaRPr lang="en-US"/>
           </a:p>
@@ -8020,7 +7905,7 @@
 </p:sld>
 </file>
 
-<file path=ppt/slides/slide27.xml><?xml version="1.0" encoding="utf-8"?>
+<file path=ppt/slides/slide26.xml><?xml version="1.0" encoding="utf-8"?>
 <p:sld xmlns:a="http://schemas.openxmlformats.org/drawingml/2006/main" xmlns:r="http://schemas.openxmlformats.org/officeDocument/2006/relationships" xmlns:p="http://schemas.openxmlformats.org/presentationml/2006/main">
   <p:cSld>
     <p:spTree>
@@ -8101,7 +7986,7 @@
             <a:fld id="{FD0725B6-5DD5-4EEE-A0F0-572C51C8D44F}" type="slidenum">
               <a:rPr lang="en-US" smtClean="0"/>
               <a:pPr/>
-              <a:t>27</a:t>
+              <a:t>26</a:t>
             </a:fld>
             <a:endParaRPr lang="en-US"/>
           </a:p>
@@ -8240,7 +8125,7 @@
 </p:sld>
 </file>
 
-<file path=ppt/slides/slide28.xml><?xml version="1.0" encoding="utf-8"?>
+<file path=ppt/slides/slide27.xml><?xml version="1.0" encoding="utf-8"?>
 <p:sld xmlns:a="http://schemas.openxmlformats.org/drawingml/2006/main" xmlns:r="http://schemas.openxmlformats.org/officeDocument/2006/relationships" xmlns:p="http://schemas.openxmlformats.org/presentationml/2006/main">
   <p:cSld>
     <p:spTree>
@@ -8298,7 +8183,7 @@
             <a:fld id="{FD0725B6-5DD5-4EEE-A0F0-572C51C8D44F}" type="slidenum">
               <a:rPr lang="en-US" smtClean="0"/>
               <a:pPr/>
-              <a:t>28</a:t>
+              <a:t>27</a:t>
             </a:fld>
             <a:endParaRPr lang="en-US"/>
           </a:p>
@@ -8344,7 +8229,7 @@
 </p:sld>
 </file>
 
-<file path=ppt/slides/slide29.xml><?xml version="1.0" encoding="utf-8"?>
+<file path=ppt/slides/slide28.xml><?xml version="1.0" encoding="utf-8"?>
 <p:sld xmlns:a="http://schemas.openxmlformats.org/drawingml/2006/main" xmlns:r="http://schemas.openxmlformats.org/officeDocument/2006/relationships" xmlns:p="http://schemas.openxmlformats.org/presentationml/2006/main">
   <p:cSld>
     <p:spTree>
@@ -8554,7 +8439,7 @@
             <a:fld id="{FD0725B6-5DD5-4EEE-A0F0-572C51C8D44F}" type="slidenum">
               <a:rPr lang="en-US" smtClean="0"/>
               <a:pPr/>
-              <a:t>29</a:t>
+              <a:t>28</a:t>
             </a:fld>
             <a:endParaRPr lang="en-US"/>
           </a:p>
@@ -8564,6 +8449,153 @@
     <p:extLst>
       <p:ext uri="{BB962C8B-B14F-4D97-AF65-F5344CB8AC3E}">
         <p14:creationId xmlns:p14="http://schemas.microsoft.com/office/powerpoint/2010/main" val="3627197052"/>
+      </p:ext>
+    </p:extLst>
+  </p:cSld>
+  <p:clrMapOvr>
+    <a:masterClrMapping/>
+  </p:clrMapOvr>
+  <p:transition>
+    <p:fade/>
+  </p:transition>
+</p:sld>
+</file>
+
+<file path=ppt/slides/slide29.xml><?xml version="1.0" encoding="utf-8"?>
+<p:sld xmlns:a="http://schemas.openxmlformats.org/drawingml/2006/main" xmlns:r="http://schemas.openxmlformats.org/officeDocument/2006/relationships" xmlns:p="http://schemas.openxmlformats.org/presentationml/2006/main">
+  <p:cSld>
+    <p:spTree>
+      <p:nvGrpSpPr>
+        <p:cNvPr id="1" name=""/>
+        <p:cNvGrpSpPr/>
+        <p:nvPr/>
+      </p:nvGrpSpPr>
+      <p:grpSpPr>
+        <a:xfrm>
+          <a:off x="0" y="0"/>
+          <a:ext cx="0" cy="0"/>
+          <a:chOff x="0" y="0"/>
+          <a:chExt cx="0" cy="0"/>
+        </a:xfrm>
+      </p:grpSpPr>
+      <p:sp>
+        <p:nvSpPr>
+          <p:cNvPr id="2" name="Content Placeholder 1"/>
+          <p:cNvSpPr>
+            <a:spLocks noGrp="1"/>
+          </p:cNvSpPr>
+          <p:nvPr>
+            <p:ph idx="1"/>
+          </p:nvPr>
+        </p:nvSpPr>
+        <p:spPr/>
+        <p:txBody>
+          <a:bodyPr/>
+          <a:lstStyle/>
+          <a:p>
+            <a:r>
+              <a:rPr lang="en-US" sz="3200" dirty="0" smtClean="0"/>
+              <a:t>Daily Stand Up</a:t>
+            </a:r>
+          </a:p>
+          <a:p>
+            <a:r>
+              <a:rPr lang="en-US" sz="3200" dirty="0" smtClean="0"/>
+              <a:t>Daily Logs of Status</a:t>
+            </a:r>
+          </a:p>
+          <a:p>
+            <a:r>
+              <a:rPr lang="en-US" sz="3200" dirty="0" smtClean="0"/>
+              <a:t>Daily Update of Scrum sheet</a:t>
+            </a:r>
+          </a:p>
+          <a:p>
+            <a:r>
+              <a:rPr lang="en-US" sz="3200" dirty="0" smtClean="0"/>
+              <a:t>Weekly Evaluations</a:t>
+            </a:r>
+          </a:p>
+          <a:p>
+            <a:r>
+              <a:rPr lang="en-US" sz="3200" dirty="0" smtClean="0"/>
+              <a:t>Code Review </a:t>
+            </a:r>
+          </a:p>
+          <a:p>
+            <a:r>
+              <a:rPr lang="en-US" sz="3200" dirty="0" smtClean="0"/>
+              <a:t>Sprint Planning  &amp; Retrospective Meetings</a:t>
+            </a:r>
+          </a:p>
+          <a:p>
+            <a:r>
+              <a:rPr lang="en-US" sz="3200" dirty="0" smtClean="0"/>
+              <a:t>Had a Review Demo with Owner</a:t>
+            </a:r>
+          </a:p>
+          <a:p>
+            <a:r>
+              <a:rPr lang="en-US" sz="3200" dirty="0" smtClean="0"/>
+              <a:t>Had an Acceptance Demo with Owner</a:t>
+            </a:r>
+          </a:p>
+          <a:p>
+            <a:endParaRPr lang="en-US" sz="3200" dirty="0"/>
+          </a:p>
+        </p:txBody>
+      </p:sp>
+      <p:sp>
+        <p:nvSpPr>
+          <p:cNvPr id="3" name="Title 2"/>
+          <p:cNvSpPr>
+            <a:spLocks noGrp="1"/>
+          </p:cNvSpPr>
+          <p:nvPr>
+            <p:ph type="title"/>
+          </p:nvPr>
+        </p:nvSpPr>
+        <p:spPr/>
+        <p:txBody>
+          <a:bodyPr/>
+          <a:lstStyle/>
+          <a:p>
+            <a:r>
+              <a:rPr lang="en-US" dirty="0" smtClean="0"/>
+              <a:t>Processes</a:t>
+            </a:r>
+            <a:endParaRPr lang="en-US" dirty="0"/>
+          </a:p>
+        </p:txBody>
+      </p:sp>
+      <p:sp>
+        <p:nvSpPr>
+          <p:cNvPr id="4" name="Slide Number Placeholder 3"/>
+          <p:cNvSpPr>
+            <a:spLocks noGrp="1"/>
+          </p:cNvSpPr>
+          <p:nvPr>
+            <p:ph type="sldNum" sz="quarter" idx="10"/>
+          </p:nvPr>
+        </p:nvSpPr>
+        <p:spPr/>
+        <p:txBody>
+          <a:bodyPr/>
+          <a:lstStyle/>
+          <a:p>
+            <a:fld id="{FD0725B6-5DD5-4EEE-A0F0-572C51C8D44F}" type="slidenum">
+              <a:rPr lang="en-US" smtClean="0"/>
+              <a:pPr/>
+              <a:t>29</a:t>
+            </a:fld>
+            <a:endParaRPr lang="en-US"/>
+          </a:p>
+        </p:txBody>
+      </p:sp>
+    </p:spTree>
+    <p:extLst>
+      <p:ext uri="{BB962C8B-B14F-4D97-AF65-F5344CB8AC3E}">
+        <p14:creationId xmlns:p14="http://schemas.microsoft.com/office/powerpoint/2010/main" val="2532835921"/>
       </p:ext>
     </p:extLst>
   </p:cSld>
@@ -9437,57 +9469,79 @@
             <p:ph idx="1"/>
           </p:nvPr>
         </p:nvSpPr>
-        <p:spPr/>
+        <p:spPr>
+          <a:xfrm>
+            <a:off x="1270000" y="2489200"/>
+            <a:ext cx="10464800" cy="6959600"/>
+          </a:xfrm>
+        </p:spPr>
         <p:txBody>
           <a:bodyPr/>
           <a:lstStyle/>
           <a:p>
+            <a:pPr lvl="0"/>
             <a:r>
               <a:rPr lang="en-US" sz="3200" dirty="0" smtClean="0"/>
-              <a:t>Daily Stand Up</a:t>
-            </a:r>
-          </a:p>
-          <a:p>
+              <a:t>Working with members from different locations</a:t>
+            </a:r>
+          </a:p>
+          <a:p>
+            <a:pPr lvl="0"/>
             <a:r>
               <a:rPr lang="en-US" sz="3200" dirty="0" smtClean="0"/>
-              <a:t>Daily Logs of Status</a:t>
-            </a:r>
-          </a:p>
-          <a:p>
+              <a:t>Multitenant Application</a:t>
+            </a:r>
+          </a:p>
+          <a:p>
+            <a:pPr lvl="0"/>
             <a:r>
               <a:rPr lang="en-US" sz="3200" dirty="0" smtClean="0"/>
-              <a:t>Daily Update of Scrum sheet</a:t>
-            </a:r>
-          </a:p>
-          <a:p>
+              <a:t>Followed Agile methodology</a:t>
+            </a:r>
+          </a:p>
+          <a:p>
+            <a:pPr lvl="0"/>
             <a:r>
               <a:rPr lang="en-US" sz="3200" dirty="0" smtClean="0"/>
-              <a:t>Weekly Evaluations</a:t>
-            </a:r>
-          </a:p>
-          <a:p>
+              <a:t>Using SCRUM Tool </a:t>
+            </a:r>
+            <a:r>
+              <a:rPr lang="en-US" sz="3200" dirty="0"/>
+              <a:t>– </a:t>
+            </a:r>
             <a:r>
               <a:rPr lang="en-US" sz="3200" dirty="0" smtClean="0"/>
-              <a:t>Code Review </a:t>
-            </a:r>
-          </a:p>
-          <a:p>
+              <a:t>Scrum desk, effectively</a:t>
+            </a:r>
+          </a:p>
+          <a:p>
+            <a:pPr lvl="0"/>
             <a:r>
               <a:rPr lang="en-US" sz="3200" dirty="0" smtClean="0"/>
-              <a:t>Sprint Planning  &amp; Retrospective Meetings</a:t>
-            </a:r>
-          </a:p>
-          <a:p>
+              <a:t>Significance of updating the tool regularly</a:t>
+            </a:r>
+          </a:p>
+          <a:p>
+            <a:pPr lvl="0"/>
             <a:r>
               <a:rPr lang="en-US" sz="3200" dirty="0" smtClean="0"/>
-              <a:t>Had a Review Demo with Owner</a:t>
-            </a:r>
-          </a:p>
-          <a:p>
+              <a:t>Unit test Cases</a:t>
+            </a:r>
+          </a:p>
+          <a:p>
+            <a:pPr lvl="0"/>
             <a:r>
               <a:rPr lang="en-US" sz="3200" dirty="0" smtClean="0"/>
-              <a:t>Had an Acceptance Demo with Owner</a:t>
-            </a:r>
+              <a:t>Test process and planning</a:t>
+            </a:r>
+          </a:p>
+          <a:p>
+            <a:pPr lvl="0"/>
+            <a:endParaRPr lang="en-US" sz="3200" dirty="0"/>
+          </a:p>
+          <a:p>
+            <a:pPr lvl="0"/>
+            <a:endParaRPr lang="en-US" sz="3200" dirty="0" smtClean="0"/>
           </a:p>
           <a:p>
             <a:endParaRPr lang="en-US" sz="3200" dirty="0"/>
@@ -9511,7 +9565,7 @@
           <a:p>
             <a:r>
               <a:rPr lang="en-US" dirty="0" smtClean="0"/>
-              <a:t>Processes</a:t>
+              <a:t>Collective Learning</a:t>
             </a:r>
             <a:endParaRPr lang="en-US" dirty="0"/>
           </a:p>
@@ -9544,7 +9598,7 @@
     </p:spTree>
     <p:extLst>
       <p:ext uri="{BB962C8B-B14F-4D97-AF65-F5344CB8AC3E}">
-        <p14:creationId xmlns:p14="http://schemas.microsoft.com/office/powerpoint/2010/main" val="2532835921"/>
+        <p14:creationId xmlns:p14="http://schemas.microsoft.com/office/powerpoint/2010/main" val="1328395740"/>
       </p:ext>
     </p:extLst>
   </p:cSld>
@@ -9554,6 +9608,13 @@
   <p:transition>
     <p:fade/>
   </p:transition>
+  <p:timing>
+    <p:tnLst>
+      <p:par>
+        <p:cTn id="1" dur="indefinite" restart="never" nodeType="tmRoot"/>
+      </p:par>
+    </p:tnLst>
+  </p:timing>
 </p:sld>
 </file>
 
@@ -9597,61 +9658,65 @@
             <a:pPr lvl="0"/>
             <a:r>
               <a:rPr lang="en-US" sz="3200" dirty="0" smtClean="0"/>
-              <a:t>Working with members from different locations</a:t>
+              <a:t>Complete Project Cycle</a:t>
             </a:r>
           </a:p>
           <a:p>
             <a:pPr lvl="0"/>
             <a:r>
+              <a:rPr lang="en-US" sz="3200" dirty="0"/>
+              <a:t>Managing tasks while working on multiple </a:t>
+            </a:r>
+            <a:r>
               <a:rPr lang="en-US" sz="3200" dirty="0" smtClean="0"/>
-              <a:t>Multitenant Application</a:t>
+              <a:t>projects</a:t>
             </a:r>
           </a:p>
           <a:p>
             <a:pPr lvl="0"/>
             <a:r>
               <a:rPr lang="en-US" sz="3200" dirty="0" smtClean="0"/>
-              <a:t>Followed Agile methodology</a:t>
+              <a:t>Accommodating Change Requests</a:t>
             </a:r>
           </a:p>
           <a:p>
             <a:pPr lvl="0"/>
             <a:r>
               <a:rPr lang="en-US" sz="3200" dirty="0" smtClean="0"/>
-              <a:t>Using SCRUM Tool </a:t>
-            </a:r>
-            <a:r>
-              <a:rPr lang="en-US" sz="3200" dirty="0"/>
-              <a:t>– </a:t>
-            </a:r>
+              <a:t>Writing features file in BDD Format.</a:t>
+            </a:r>
+          </a:p>
+          <a:p>
+            <a:pPr lvl="0"/>
             <a:r>
               <a:rPr lang="en-US" sz="3200" dirty="0" smtClean="0"/>
-              <a:t>Scrum desk, effectively</a:t>
+              <a:t>Understating of writing feature files using user story.</a:t>
             </a:r>
           </a:p>
           <a:p>
             <a:pPr lvl="0"/>
             <a:r>
               <a:rPr lang="en-US" sz="3200" dirty="0" smtClean="0"/>
-              <a:t>Significance of updating the tool regularly</a:t>
+              <a:t>Writing feature file in table format</a:t>
             </a:r>
           </a:p>
           <a:p>
             <a:pPr lvl="0"/>
             <a:r>
               <a:rPr lang="en-US" sz="3200" dirty="0" smtClean="0"/>
-              <a:t>Unit test Cases</a:t>
-            </a:r>
-          </a:p>
-          <a:p>
-            <a:pPr lvl="0"/>
-            <a:r>
-              <a:rPr lang="en-US" sz="3200" dirty="0" smtClean="0"/>
-              <a:t>Test process and planning</a:t>
-            </a:r>
-          </a:p>
-          <a:p>
-            <a:pPr lvl="0"/>
+              <a:t>Sprint Boot</a:t>
+            </a:r>
+          </a:p>
+          <a:p>
+            <a:pPr marL="0" lvl="0" indent="0">
+              <a:buNone/>
+            </a:pPr>
+            <a:endParaRPr lang="en-US" sz="3200" dirty="0" smtClean="0"/>
+          </a:p>
+          <a:p>
+            <a:pPr marL="0" lvl="0" indent="0">
+              <a:buNone/>
+            </a:pPr>
             <a:endParaRPr lang="en-US" sz="3200" dirty="0"/>
           </a:p>
           <a:p>
@@ -9713,7 +9778,7 @@
     </p:spTree>
     <p:extLst>
       <p:ext uri="{BB962C8B-B14F-4D97-AF65-F5344CB8AC3E}">
-        <p14:creationId xmlns:p14="http://schemas.microsoft.com/office/powerpoint/2010/main" val="1328395740"/>
+        <p14:creationId xmlns:p14="http://schemas.microsoft.com/office/powerpoint/2010/main" val="3740603699"/>
       </p:ext>
     </p:extLst>
   </p:cSld>
@@ -9760,86 +9825,21 @@
             <p:ph idx="1"/>
           </p:nvPr>
         </p:nvSpPr>
-        <p:spPr>
-          <a:xfrm>
-            <a:off x="1270000" y="2489200"/>
-            <a:ext cx="10464800" cy="6959600"/>
-          </a:xfrm>
-        </p:spPr>
+        <p:spPr/>
         <p:txBody>
           <a:bodyPr/>
           <a:lstStyle/>
           <a:p>
-            <a:pPr lvl="0"/>
             <a:r>
               <a:rPr lang="en-US" sz="3200" dirty="0" smtClean="0"/>
-              <a:t>Complete Project Cycle</a:t>
-            </a:r>
-          </a:p>
-          <a:p>
-            <a:pPr lvl="0"/>
-            <a:r>
-              <a:rPr lang="en-US" sz="3200" dirty="0"/>
-              <a:t>Managing tasks while working on multiple </a:t>
-            </a:r>
+              <a:t>We would like to thank Raghvendra and Bhagyesh for their continuous guidance, taking out time every day to attend our calls, closely examining and providing feedback</a:t>
+            </a:r>
+          </a:p>
+          <a:p>
             <a:r>
               <a:rPr lang="en-US" sz="3200" dirty="0" smtClean="0"/>
-              <a:t>projects</a:t>
-            </a:r>
-          </a:p>
-          <a:p>
-            <a:pPr lvl="0"/>
-            <a:r>
-              <a:rPr lang="en-US" sz="3200" dirty="0" smtClean="0"/>
-              <a:t>Accommodating Change Requests</a:t>
-            </a:r>
-          </a:p>
-          <a:p>
-            <a:pPr lvl="0"/>
-            <a:r>
-              <a:rPr lang="en-US" sz="3200" dirty="0" smtClean="0"/>
-              <a:t>Writing features file in BDD Format.</a:t>
-            </a:r>
-          </a:p>
-          <a:p>
-            <a:pPr lvl="0"/>
-            <a:r>
-              <a:rPr lang="en-US" sz="3200" dirty="0" smtClean="0"/>
-              <a:t>Understating of writing feature files using user story.</a:t>
-            </a:r>
-          </a:p>
-          <a:p>
-            <a:pPr lvl="0"/>
-            <a:r>
-              <a:rPr lang="en-US" sz="3200" dirty="0" smtClean="0"/>
-              <a:t>Writing feature file in table format</a:t>
-            </a:r>
-          </a:p>
-          <a:p>
-            <a:pPr lvl="0"/>
-            <a:r>
-              <a:rPr lang="en-US" sz="3200" dirty="0" smtClean="0"/>
-              <a:t>Sprint Boot</a:t>
-            </a:r>
-          </a:p>
-          <a:p>
-            <a:pPr marL="0" lvl="0" indent="0">
-              <a:buNone/>
-            </a:pPr>
-            <a:endParaRPr lang="en-US" sz="3200" dirty="0" smtClean="0"/>
-          </a:p>
-          <a:p>
-            <a:pPr marL="0" lvl="0" indent="0">
-              <a:buNone/>
-            </a:pPr>
-            <a:endParaRPr lang="en-US" sz="3200" dirty="0"/>
-          </a:p>
-          <a:p>
-            <a:pPr lvl="0"/>
-            <a:endParaRPr lang="en-US" sz="3200" dirty="0" smtClean="0"/>
-          </a:p>
-          <a:p>
-            <a:endParaRPr lang="en-US" sz="3200" dirty="0"/>
+              <a:t>Thank you for letting us know where we lacked and for keeping us aligned in right direction.</a:t>
+            </a:r>
           </a:p>
         </p:txBody>
       </p:sp>
@@ -9860,7 +9860,7 @@
           <a:p>
             <a:r>
               <a:rPr lang="en-US" dirty="0" smtClean="0"/>
-              <a:t>Collective Learning</a:t>
+              <a:t>Gratitude</a:t>
             </a:r>
             <a:endParaRPr lang="en-US" dirty="0"/>
           </a:p>
@@ -9885,121 +9885,6 @@
               <a:rPr lang="en-US" smtClean="0"/>
               <a:pPr/>
               <a:t>32</a:t>
-            </a:fld>
-            <a:endParaRPr lang="en-US"/>
-          </a:p>
-        </p:txBody>
-      </p:sp>
-    </p:spTree>
-    <p:extLst>
-      <p:ext uri="{BB962C8B-B14F-4D97-AF65-F5344CB8AC3E}">
-        <p14:creationId xmlns:p14="http://schemas.microsoft.com/office/powerpoint/2010/main" val="3740603699"/>
-      </p:ext>
-    </p:extLst>
-  </p:cSld>
-  <p:clrMapOvr>
-    <a:masterClrMapping/>
-  </p:clrMapOvr>
-  <p:transition>
-    <p:fade/>
-  </p:transition>
-  <p:timing>
-    <p:tnLst>
-      <p:par>
-        <p:cTn id="1" dur="indefinite" restart="never" nodeType="tmRoot"/>
-      </p:par>
-    </p:tnLst>
-  </p:timing>
-</p:sld>
-</file>
-
-<file path=ppt/slides/slide33.xml><?xml version="1.0" encoding="utf-8"?>
-<p:sld xmlns:a="http://schemas.openxmlformats.org/drawingml/2006/main" xmlns:r="http://schemas.openxmlformats.org/officeDocument/2006/relationships" xmlns:p="http://schemas.openxmlformats.org/presentationml/2006/main">
-  <p:cSld>
-    <p:spTree>
-      <p:nvGrpSpPr>
-        <p:cNvPr id="1" name=""/>
-        <p:cNvGrpSpPr/>
-        <p:nvPr/>
-      </p:nvGrpSpPr>
-      <p:grpSpPr>
-        <a:xfrm>
-          <a:off x="0" y="0"/>
-          <a:ext cx="0" cy="0"/>
-          <a:chOff x="0" y="0"/>
-          <a:chExt cx="0" cy="0"/>
-        </a:xfrm>
-      </p:grpSpPr>
-      <p:sp>
-        <p:nvSpPr>
-          <p:cNvPr id="2" name="Content Placeholder 1"/>
-          <p:cNvSpPr>
-            <a:spLocks noGrp="1"/>
-          </p:cNvSpPr>
-          <p:nvPr>
-            <p:ph idx="1"/>
-          </p:nvPr>
-        </p:nvSpPr>
-        <p:spPr/>
-        <p:txBody>
-          <a:bodyPr/>
-          <a:lstStyle/>
-          <a:p>
-            <a:r>
-              <a:rPr lang="en-US" sz="3200" dirty="0" smtClean="0"/>
-              <a:t>We would like to thank Raghvendra and Bhagyesh for their continuous guidance, taking out time every day to attend our calls, closely examining and providing feedback</a:t>
-            </a:r>
-          </a:p>
-          <a:p>
-            <a:r>
-              <a:rPr lang="en-US" sz="3200" dirty="0" smtClean="0"/>
-              <a:t>Thank you for letting us know where we lacked and for keeping us aligned in right direction.</a:t>
-            </a:r>
-          </a:p>
-        </p:txBody>
-      </p:sp>
-      <p:sp>
-        <p:nvSpPr>
-          <p:cNvPr id="3" name="Title 2"/>
-          <p:cNvSpPr>
-            <a:spLocks noGrp="1"/>
-          </p:cNvSpPr>
-          <p:nvPr>
-            <p:ph type="title"/>
-          </p:nvPr>
-        </p:nvSpPr>
-        <p:spPr/>
-        <p:txBody>
-          <a:bodyPr/>
-          <a:lstStyle/>
-          <a:p>
-            <a:r>
-              <a:rPr lang="en-US" dirty="0" smtClean="0"/>
-              <a:t>Gratitude</a:t>
-            </a:r>
-            <a:endParaRPr lang="en-US" dirty="0"/>
-          </a:p>
-        </p:txBody>
-      </p:sp>
-      <p:sp>
-        <p:nvSpPr>
-          <p:cNvPr id="4" name="Slide Number Placeholder 3"/>
-          <p:cNvSpPr>
-            <a:spLocks noGrp="1"/>
-          </p:cNvSpPr>
-          <p:nvPr>
-            <p:ph type="sldNum" sz="quarter" idx="10"/>
-          </p:nvPr>
-        </p:nvSpPr>
-        <p:spPr/>
-        <p:txBody>
-          <a:bodyPr/>
-          <a:lstStyle/>
-          <a:p>
-            <a:fld id="{FD0725B6-5DD5-4EEE-A0F0-572C51C8D44F}" type="slidenum">
-              <a:rPr lang="en-US" smtClean="0"/>
-              <a:pPr/>
-              <a:t>33</a:t>
             </a:fld>
             <a:endParaRPr lang="en-US"/>
           </a:p>
@@ -10028,7 +9913,7 @@
 </p:sld>
 </file>
 
-<file path=ppt/slides/slide34.xml><?xml version="1.0" encoding="utf-8"?>
+<file path=ppt/slides/slide33.xml><?xml version="1.0" encoding="utf-8"?>
 <p:sld xmlns:a="http://schemas.openxmlformats.org/drawingml/2006/main" xmlns:r="http://schemas.openxmlformats.org/officeDocument/2006/relationships" xmlns:p="http://schemas.openxmlformats.org/presentationml/2006/main" showMasterSp="0">
   <p:cSld>
     <p:spTree>
@@ -10092,7 +9977,7 @@
             <a:fld id="{FD0725B6-5DD5-4EEE-A0F0-572C51C8D44F}" type="slidenum">
               <a:rPr lang="en-US" smtClean="0"/>
               <a:pPr/>
-              <a:t>34</a:t>
+              <a:t>33</a:t>
             </a:fld>
             <a:endParaRPr lang="en-US"/>
           </a:p>
@@ -10573,120 +10458,6 @@
             <p:ph idx="1"/>
           </p:nvPr>
         </p:nvSpPr>
-        <p:spPr>
-          <a:xfrm>
-            <a:off x="1270000" y="2540000"/>
-            <a:ext cx="10464800" cy="3708400"/>
-          </a:xfrm>
-        </p:spPr>
-        <p:txBody>
-          <a:bodyPr/>
-          <a:lstStyle/>
-          <a:p>
-            <a:endParaRPr lang="en-US" sz="2400" dirty="0" smtClean="0">
-              <a:latin typeface="Times New Roman" pitchFamily="18" charset="0"/>
-              <a:cs typeface="Times New Roman" pitchFamily="18" charset="0"/>
-            </a:endParaRPr>
-          </a:p>
-        </p:txBody>
-      </p:sp>
-      <p:sp>
-        <p:nvSpPr>
-          <p:cNvPr id="3" name="Title 2"/>
-          <p:cNvSpPr>
-            <a:spLocks noGrp="1"/>
-          </p:cNvSpPr>
-          <p:nvPr>
-            <p:ph type="title"/>
-          </p:nvPr>
-        </p:nvSpPr>
-        <p:spPr/>
-        <p:txBody>
-          <a:bodyPr/>
-          <a:lstStyle/>
-          <a:p>
-            <a:r>
-              <a:rPr lang="en-US" sz="5400" dirty="0" smtClean="0"/>
-              <a:t>Change Requests </a:t>
-            </a:r>
-            <a:endParaRPr lang="en-US" sz="4000" dirty="0"/>
-          </a:p>
-        </p:txBody>
-      </p:sp>
-      <p:sp>
-        <p:nvSpPr>
-          <p:cNvPr id="4" name="Slide Number Placeholder 3"/>
-          <p:cNvSpPr>
-            <a:spLocks noGrp="1"/>
-          </p:cNvSpPr>
-          <p:nvPr>
-            <p:ph type="sldNum" sz="quarter" idx="10"/>
-          </p:nvPr>
-        </p:nvSpPr>
-        <p:spPr/>
-        <p:txBody>
-          <a:bodyPr/>
-          <a:lstStyle/>
-          <a:p>
-            <a:fld id="{FD0725B6-5DD5-4EEE-A0F0-572C51C8D44F}" type="slidenum">
-              <a:rPr lang="en-US" smtClean="0"/>
-              <a:pPr/>
-              <a:t>6</a:t>
-            </a:fld>
-            <a:endParaRPr lang="en-US"/>
-          </a:p>
-        </p:txBody>
-      </p:sp>
-    </p:spTree>
-    <p:extLst>
-      <p:ext uri="{BB962C8B-B14F-4D97-AF65-F5344CB8AC3E}">
-        <p14:creationId xmlns:p14="http://schemas.microsoft.com/office/powerpoint/2010/main" val="2566472314"/>
-      </p:ext>
-    </p:extLst>
-  </p:cSld>
-  <p:clrMapOvr>
-    <a:masterClrMapping/>
-  </p:clrMapOvr>
-  <p:transition>
-    <p:fade/>
-  </p:transition>
-  <p:timing>
-    <p:tnLst>
-      <p:par>
-        <p:cTn id="1" dur="indefinite" restart="never" nodeType="tmRoot"/>
-      </p:par>
-    </p:tnLst>
-  </p:timing>
-</p:sld>
-</file>
-
-<file path=ppt/slides/slide7.xml><?xml version="1.0" encoding="utf-8"?>
-<p:sld xmlns:a="http://schemas.openxmlformats.org/drawingml/2006/main" xmlns:r="http://schemas.openxmlformats.org/officeDocument/2006/relationships" xmlns:p="http://schemas.openxmlformats.org/presentationml/2006/main">
-  <p:cSld>
-    <p:spTree>
-      <p:nvGrpSpPr>
-        <p:cNvPr id="1" name=""/>
-        <p:cNvGrpSpPr/>
-        <p:nvPr/>
-      </p:nvGrpSpPr>
-      <p:grpSpPr>
-        <a:xfrm>
-          <a:off x="0" y="0"/>
-          <a:ext cx="0" cy="0"/>
-          <a:chOff x="0" y="0"/>
-          <a:chExt cx="0" cy="0"/>
-        </a:xfrm>
-      </p:grpSpPr>
-      <p:sp>
-        <p:nvSpPr>
-          <p:cNvPr id="2" name="Content Placeholder 1"/>
-          <p:cNvSpPr>
-            <a:spLocks noGrp="1"/>
-          </p:cNvSpPr>
-          <p:nvPr>
-            <p:ph idx="1"/>
-          </p:nvPr>
-        </p:nvSpPr>
         <p:spPr/>
         <p:txBody>
           <a:bodyPr/>
@@ -10746,7 +10517,7 @@
             <a:fld id="{FD0725B6-5DD5-4EEE-A0F0-572C51C8D44F}" type="slidenum">
               <a:rPr lang="en-US" smtClean="0"/>
               <a:pPr/>
-              <a:t>7</a:t>
+              <a:t>6</a:t>
             </a:fld>
             <a:endParaRPr lang="en-US"/>
           </a:p>
@@ -14214,7 +13985,7 @@
 </p:sld>
 </file>
 
-<file path=ppt/slides/slide8.xml><?xml version="1.0" encoding="utf-8"?>
+<file path=ppt/slides/slide7.xml><?xml version="1.0" encoding="utf-8"?>
 <p:sld xmlns:a="http://schemas.openxmlformats.org/drawingml/2006/main" xmlns:r="http://schemas.openxmlformats.org/officeDocument/2006/relationships" xmlns:p="http://schemas.openxmlformats.org/presentationml/2006/main">
   <p:cSld>
     <p:spTree>
@@ -14295,7 +14066,7 @@
             <a:fld id="{FD0725B6-5DD5-4EEE-A0F0-572C51C8D44F}" type="slidenum">
               <a:rPr lang="en-US" smtClean="0"/>
               <a:pPr/>
-              <a:t>8</a:t>
+              <a:t>7</a:t>
             </a:fld>
             <a:endParaRPr lang="en-US"/>
           </a:p>
@@ -14348,7 +14119,7 @@
 </p:sld>
 </file>
 
-<file path=ppt/slides/slide9.xml><?xml version="1.0" encoding="utf-8"?>
+<file path=ppt/slides/slide8.xml><?xml version="1.0" encoding="utf-8"?>
 <p:sld xmlns:a="http://schemas.openxmlformats.org/drawingml/2006/main" xmlns:r="http://schemas.openxmlformats.org/officeDocument/2006/relationships" xmlns:p="http://schemas.openxmlformats.org/presentationml/2006/main">
   <p:cSld>
     <p:spTree>
@@ -14405,7 +14176,7 @@
             <a:fld id="{FD0725B6-5DD5-4EEE-A0F0-572C51C8D44F}" type="slidenum">
               <a:rPr lang="en-US" smtClean="0"/>
               <a:pPr/>
-              <a:t>9</a:t>
+              <a:t>8</a:t>
             </a:fld>
             <a:endParaRPr lang="en-US"/>
           </a:p>
@@ -14441,6 +14212,120 @@
     <p:extLst>
       <p:ext uri="{BB962C8B-B14F-4D97-AF65-F5344CB8AC3E}">
         <p14:creationId xmlns:p14="http://schemas.microsoft.com/office/powerpoint/2010/main" val="898805001"/>
+      </p:ext>
+    </p:extLst>
+  </p:cSld>
+  <p:clrMapOvr>
+    <a:masterClrMapping/>
+  </p:clrMapOvr>
+  <p:transition>
+    <p:fade/>
+  </p:transition>
+</p:sld>
+</file>
+
+<file path=ppt/slides/slide9.xml><?xml version="1.0" encoding="utf-8"?>
+<p:sld xmlns:a="http://schemas.openxmlformats.org/drawingml/2006/main" xmlns:r="http://schemas.openxmlformats.org/officeDocument/2006/relationships" xmlns:p="http://schemas.openxmlformats.org/presentationml/2006/main">
+  <p:cSld>
+    <p:spTree>
+      <p:nvGrpSpPr>
+        <p:cNvPr id="1" name=""/>
+        <p:cNvGrpSpPr/>
+        <p:nvPr/>
+      </p:nvGrpSpPr>
+      <p:grpSpPr>
+        <a:xfrm>
+          <a:off x="0" y="0"/>
+          <a:ext cx="0" cy="0"/>
+          <a:chOff x="0" y="0"/>
+          <a:chExt cx="0" cy="0"/>
+        </a:xfrm>
+      </p:grpSpPr>
+      <p:sp>
+        <p:nvSpPr>
+          <p:cNvPr id="3" name="Title 2"/>
+          <p:cNvSpPr>
+            <a:spLocks noGrp="1"/>
+          </p:cNvSpPr>
+          <p:nvPr>
+            <p:ph type="title"/>
+          </p:nvPr>
+        </p:nvSpPr>
+        <p:spPr>
+          <a:xfrm>
+            <a:off x="1270000" y="304800"/>
+            <a:ext cx="10464800" cy="2743200"/>
+          </a:xfrm>
+        </p:spPr>
+        <p:txBody>
+          <a:bodyPr/>
+          <a:lstStyle/>
+          <a:p>
+            <a:r>
+              <a:rPr lang="en-US" dirty="0"/>
+              <a:t>Service / Request Flow</a:t>
+            </a:r>
+            <a:br>
+              <a:rPr lang="en-US" dirty="0"/>
+            </a:br>
+            <a:endParaRPr lang="en-US" dirty="0"/>
+          </a:p>
+        </p:txBody>
+      </p:sp>
+      <p:sp>
+        <p:nvSpPr>
+          <p:cNvPr id="4" name="Slide Number Placeholder 3"/>
+          <p:cNvSpPr>
+            <a:spLocks noGrp="1"/>
+          </p:cNvSpPr>
+          <p:nvPr>
+            <p:ph type="sldNum" sz="quarter" idx="10"/>
+          </p:nvPr>
+        </p:nvSpPr>
+        <p:spPr/>
+        <p:txBody>
+          <a:bodyPr/>
+          <a:lstStyle/>
+          <a:p>
+            <a:fld id="{FD0725B6-5DD5-4EEE-A0F0-572C51C8D44F}" type="slidenum">
+              <a:rPr lang="en-US" smtClean="0"/>
+              <a:pPr/>
+              <a:t>9</a:t>
+            </a:fld>
+            <a:endParaRPr lang="en-US"/>
+          </a:p>
+        </p:txBody>
+      </p:sp>
+      <p:pic>
+        <p:nvPicPr>
+          <p:cNvPr id="5" name="Content Placeholder 4"/>
+          <p:cNvPicPr>
+            <a:picLocks noGrp="1" noChangeAspect="1"/>
+          </p:cNvPicPr>
+          <p:nvPr>
+            <p:ph idx="1"/>
+          </p:nvPr>
+        </p:nvPicPr>
+        <p:blipFill>
+          <a:blip r:embed="rId2"/>
+          <a:stretch>
+            <a:fillRect/>
+          </a:stretch>
+        </p:blipFill>
+        <p:spPr>
+          <a:xfrm>
+            <a:off x="1016000" y="2751499"/>
+            <a:ext cx="10896600" cy="6382976"/>
+          </a:xfrm>
+          <a:prstGeom prst="rect">
+            <a:avLst/>
+          </a:prstGeom>
+        </p:spPr>
+      </p:pic>
+    </p:spTree>
+    <p:extLst>
+      <p:ext uri="{BB962C8B-B14F-4D97-AF65-F5344CB8AC3E}">
+        <p14:creationId xmlns:p14="http://schemas.microsoft.com/office/powerpoint/2010/main" val="1593345565"/>
       </p:ext>
     </p:extLst>
   </p:cSld>

</xml_diff>